<commit_message>
verder gewerkt aan experimentatie
</commit_message>
<xml_diff>
--- a/Presentaties/storyboard eindpresentatie.pptx
+++ b/Presentaties/storyboard eindpresentatie.pptx
@@ -10,11 +10,12 @@
     <p:sldId id="265" r:id="rId4"/>
     <p:sldId id="258" r:id="rId5"/>
     <p:sldId id="259" r:id="rId6"/>
-    <p:sldId id="260" r:id="rId7"/>
-    <p:sldId id="261" r:id="rId8"/>
-    <p:sldId id="262" r:id="rId9"/>
-    <p:sldId id="263" r:id="rId10"/>
-    <p:sldId id="264" r:id="rId11"/>
+    <p:sldId id="267" r:id="rId7"/>
+    <p:sldId id="260" r:id="rId8"/>
+    <p:sldId id="261" r:id="rId9"/>
+    <p:sldId id="262" r:id="rId10"/>
+    <p:sldId id="263" r:id="rId11"/>
+    <p:sldId id="264" r:id="rId12"/>
   </p:sldIdLst>
   <p:sldSz cx="12192000" cy="6858000"/>
   <p:notesSz cx="6858000" cy="9144000"/>
@@ -292,7 +293,7 @@
           <a:p>
             <a:fld id="{B2E4F3CE-5921-4ADD-9964-2DE7A47474AF}" type="datetimeFigureOut">
               <a:rPr lang="nl-NL" smtClean="0"/>
-              <a:t>23-5-2018</a:t>
+              <a:t>24-5-2018</a:t>
             </a:fld>
             <a:endParaRPr lang="nl-NL"/>
           </a:p>
@@ -360,7 +361,7 @@
           <a:p>
             <a:fld id="{F9A998D0-4466-47BE-85E2-8C9E3531AFF1}" type="slidenum">
               <a:rPr lang="nl-NL" smtClean="0"/>
-              <a:t>‹#›</a:t>
+              <a:t>‹nr.›</a:t>
             </a:fld>
             <a:endParaRPr lang="nl-NL"/>
           </a:p>
@@ -500,7 +501,7 @@
           <p:cNvPr id="10" name="Picture 9" descr="A group of people in a room&#10;&#10;Description generated with very high confidence">
             <a:extLst>
               <a:ext uri="{FF2B5EF4-FFF2-40B4-BE49-F238E27FC236}">
-                <a16:creationId xmlns:a16="http://schemas.microsoft.com/office/drawing/2014/main" id="{8A636BD5-65AA-4211-BE9A-C3728CA22021}"/>
+                <a16:creationId xmlns:a16="http://schemas.microsoft.com/office/drawing/2014/main" xmlns="" id="{8A636BD5-65AA-4211-BE9A-C3728CA22021}"/>
               </a:ext>
             </a:extLst>
           </p:cNvPr>
@@ -541,7 +542,7 @@
           <p:cNvPr id="12" name="Picture 11" descr="A group of people in a room&#10;&#10;Description generated with very high confidence">
             <a:extLst>
               <a:ext uri="{FF2B5EF4-FFF2-40B4-BE49-F238E27FC236}">
-                <a16:creationId xmlns:a16="http://schemas.microsoft.com/office/drawing/2014/main" id="{FCCAA0F4-9C7B-4984-8F70-FA270D007429}"/>
+                <a16:creationId xmlns:a16="http://schemas.microsoft.com/office/drawing/2014/main" xmlns="" id="{FCCAA0F4-9C7B-4984-8F70-FA270D007429}"/>
               </a:ext>
             </a:extLst>
           </p:cNvPr>
@@ -612,7 +613,7 @@
           <p:cNvPr id="2" name="Title 1">
             <a:extLst>
               <a:ext uri="{FF2B5EF4-FFF2-40B4-BE49-F238E27FC236}">
-                <a16:creationId xmlns:a16="http://schemas.microsoft.com/office/drawing/2014/main" id="{6FC13C6F-2E16-4E4C-84CC-D4DAFCB2700D}"/>
+                <a16:creationId xmlns:a16="http://schemas.microsoft.com/office/drawing/2014/main" xmlns="" id="{6FC13C6F-2E16-4E4C-84CC-D4DAFCB2700D}"/>
               </a:ext>
             </a:extLst>
           </p:cNvPr>
@@ -650,7 +651,7 @@
           <p:cNvPr id="3" name="Subtitle 2">
             <a:extLst>
               <a:ext uri="{FF2B5EF4-FFF2-40B4-BE49-F238E27FC236}">
-                <a16:creationId xmlns:a16="http://schemas.microsoft.com/office/drawing/2014/main" id="{453CFFDF-F98C-4C73-86C1-B63C7BFD4C39}"/>
+                <a16:creationId xmlns:a16="http://schemas.microsoft.com/office/drawing/2014/main" xmlns="" id="{453CFFDF-F98C-4C73-86C1-B63C7BFD4C39}"/>
               </a:ext>
             </a:extLst>
           </p:cNvPr>
@@ -721,7 +722,7 @@
           <p:cNvPr id="4" name="Date Placeholder 3">
             <a:extLst>
               <a:ext uri="{FF2B5EF4-FFF2-40B4-BE49-F238E27FC236}">
-                <a16:creationId xmlns:a16="http://schemas.microsoft.com/office/drawing/2014/main" id="{CFA081B8-BD76-443C-93F5-08182166D8D0}"/>
+                <a16:creationId xmlns:a16="http://schemas.microsoft.com/office/drawing/2014/main" xmlns="" id="{CFA081B8-BD76-443C-93F5-08182166D8D0}"/>
               </a:ext>
             </a:extLst>
           </p:cNvPr>
@@ -739,7 +740,7 @@
           <a:p>
             <a:fld id="{B2E4F3CE-5921-4ADD-9964-2DE7A47474AF}" type="datetimeFigureOut">
               <a:rPr lang="nl-NL" smtClean="0"/>
-              <a:t>23-5-2018</a:t>
+              <a:t>24-5-2018</a:t>
             </a:fld>
             <a:endParaRPr lang="nl-NL"/>
           </a:p>
@@ -750,7 +751,7 @@
           <p:cNvPr id="5" name="Footer Placeholder 4">
             <a:extLst>
               <a:ext uri="{FF2B5EF4-FFF2-40B4-BE49-F238E27FC236}">
-                <a16:creationId xmlns:a16="http://schemas.microsoft.com/office/drawing/2014/main" id="{B372371A-431A-4C4A-B2D5-5DB4CE736915}"/>
+                <a16:creationId xmlns:a16="http://schemas.microsoft.com/office/drawing/2014/main" xmlns="" id="{B372371A-431A-4C4A-B2D5-5DB4CE736915}"/>
               </a:ext>
             </a:extLst>
           </p:cNvPr>
@@ -775,7 +776,7 @@
           <p:cNvPr id="6" name="Slide Number Placeholder 5">
             <a:extLst>
               <a:ext uri="{FF2B5EF4-FFF2-40B4-BE49-F238E27FC236}">
-                <a16:creationId xmlns:a16="http://schemas.microsoft.com/office/drawing/2014/main" id="{4440A448-9C23-42D3-B380-8BFAE71DF757}"/>
+                <a16:creationId xmlns:a16="http://schemas.microsoft.com/office/drawing/2014/main" xmlns="" id="{4440A448-9C23-42D3-B380-8BFAE71DF757}"/>
               </a:ext>
             </a:extLst>
           </p:cNvPr>
@@ -793,7 +794,7 @@
           <a:p>
             <a:fld id="{F9A998D0-4466-47BE-85E2-8C9E3531AFF1}" type="slidenum">
               <a:rPr lang="nl-NL" smtClean="0"/>
-              <a:t>‹#›</a:t>
+              <a:t>‹nr.›</a:t>
             </a:fld>
             <a:endParaRPr lang="nl-NL"/>
           </a:p>
@@ -938,7 +939,7 @@
           <a:p>
             <a:fld id="{B2E4F3CE-5921-4ADD-9964-2DE7A47474AF}" type="datetimeFigureOut">
               <a:rPr lang="nl-NL" smtClean="0"/>
-              <a:t>23-5-2018</a:t>
+              <a:t>24-5-2018</a:t>
             </a:fld>
             <a:endParaRPr lang="nl-NL"/>
           </a:p>
@@ -980,7 +981,7 @@
           <a:p>
             <a:fld id="{F9A998D0-4466-47BE-85E2-8C9E3531AFF1}" type="slidenum">
               <a:rPr lang="nl-NL" smtClean="0"/>
-              <a:t>‹#›</a:t>
+              <a:t>‹nr.›</a:t>
             </a:fld>
             <a:endParaRPr lang="nl-NL"/>
           </a:p>
@@ -1209,7 +1210,7 @@
           <a:p>
             <a:fld id="{B2E4F3CE-5921-4ADD-9964-2DE7A47474AF}" type="datetimeFigureOut">
               <a:rPr lang="nl-NL" smtClean="0"/>
-              <a:t>23-5-2018</a:t>
+              <a:t>24-5-2018</a:t>
             </a:fld>
             <a:endParaRPr lang="nl-NL"/>
           </a:p>
@@ -1277,7 +1278,7 @@
           <a:p>
             <a:fld id="{F9A998D0-4466-47BE-85E2-8C9E3531AFF1}" type="slidenum">
               <a:rPr lang="nl-NL" smtClean="0"/>
-              <a:t>‹#›</a:t>
+              <a:t>‹nr.›</a:t>
             </a:fld>
             <a:endParaRPr lang="nl-NL"/>
           </a:p>
@@ -1344,7 +1345,7 @@
           <p:cNvPr id="9" name="Picture 8" descr="A group of people in a room&#10;&#10;Description generated with very high confidence">
             <a:extLst>
               <a:ext uri="{FF2B5EF4-FFF2-40B4-BE49-F238E27FC236}">
-                <a16:creationId xmlns:a16="http://schemas.microsoft.com/office/drawing/2014/main" id="{1100C0BB-10D3-488D-AF46-8E80E778FCC2}"/>
+                <a16:creationId xmlns:a16="http://schemas.microsoft.com/office/drawing/2014/main" xmlns="" id="{1100C0BB-10D3-488D-AF46-8E80E778FCC2}"/>
               </a:ext>
             </a:extLst>
           </p:cNvPr>
@@ -1644,7 +1645,7 @@
           <a:p>
             <a:fld id="{B2E4F3CE-5921-4ADD-9964-2DE7A47474AF}" type="datetimeFigureOut">
               <a:rPr lang="nl-NL" smtClean="0"/>
-              <a:t>23-5-2018</a:t>
+              <a:t>24-5-2018</a:t>
             </a:fld>
             <a:endParaRPr lang="nl-NL"/>
           </a:p>
@@ -1686,7 +1687,7 @@
           <a:p>
             <a:fld id="{F9A998D0-4466-47BE-85E2-8C9E3531AFF1}" type="slidenum">
               <a:rPr lang="nl-NL" smtClean="0"/>
-              <a:t>‹#›</a:t>
+              <a:t>‹nr.›</a:t>
             </a:fld>
             <a:endParaRPr lang="nl-NL"/>
           </a:p>
@@ -2121,7 +2122,7 @@
           <a:p>
             <a:fld id="{B2E4F3CE-5921-4ADD-9964-2DE7A47474AF}" type="datetimeFigureOut">
               <a:rPr lang="nl-NL" smtClean="0"/>
-              <a:t>23-5-2018</a:t>
+              <a:t>24-5-2018</a:t>
             </a:fld>
             <a:endParaRPr lang="nl-NL"/>
           </a:p>
@@ -2163,7 +2164,7 @@
           <a:p>
             <a:fld id="{F9A998D0-4466-47BE-85E2-8C9E3531AFF1}" type="slidenum">
               <a:rPr lang="nl-NL" smtClean="0"/>
-              <a:t>‹#›</a:t>
+              <a:t>‹nr.›</a:t>
             </a:fld>
             <a:endParaRPr lang="nl-NL"/>
           </a:p>
@@ -2239,7 +2240,7 @@
           <a:p>
             <a:fld id="{B2E4F3CE-5921-4ADD-9964-2DE7A47474AF}" type="datetimeFigureOut">
               <a:rPr lang="nl-NL" smtClean="0"/>
-              <a:t>23-5-2018</a:t>
+              <a:t>24-5-2018</a:t>
             </a:fld>
             <a:endParaRPr lang="nl-NL"/>
           </a:p>
@@ -2281,7 +2282,7 @@
           <a:p>
             <a:fld id="{F9A998D0-4466-47BE-85E2-8C9E3531AFF1}" type="slidenum">
               <a:rPr lang="nl-NL" smtClean="0"/>
-              <a:t>‹#›</a:t>
+              <a:t>‹nr.›</a:t>
             </a:fld>
             <a:endParaRPr lang="nl-NL"/>
           </a:p>
@@ -2334,7 +2335,7 @@
           <a:p>
             <a:fld id="{B2E4F3CE-5921-4ADD-9964-2DE7A47474AF}" type="datetimeFigureOut">
               <a:rPr lang="nl-NL" smtClean="0"/>
-              <a:t>23-5-2018</a:t>
+              <a:t>24-5-2018</a:t>
             </a:fld>
             <a:endParaRPr lang="nl-NL"/>
           </a:p>
@@ -2376,7 +2377,7 @@
           <a:p>
             <a:fld id="{F9A998D0-4466-47BE-85E2-8C9E3531AFF1}" type="slidenum">
               <a:rPr lang="nl-NL" smtClean="0"/>
-              <a:t>‹#›</a:t>
+              <a:t>‹nr.›</a:t>
             </a:fld>
             <a:endParaRPr lang="nl-NL"/>
           </a:p>
@@ -2509,7 +2510,7 @@
           <a:p>
             <a:fld id="{B2E4F3CE-5921-4ADD-9964-2DE7A47474AF}" type="datetimeFigureOut">
               <a:rPr lang="nl-NL" smtClean="0"/>
-              <a:t>23-5-2018</a:t>
+              <a:t>24-5-2018</a:t>
             </a:fld>
             <a:endParaRPr lang="nl-NL"/>
           </a:p>
@@ -2551,7 +2552,7 @@
           <a:p>
             <a:fld id="{F9A998D0-4466-47BE-85E2-8C9E3531AFF1}" type="slidenum">
               <a:rPr lang="nl-NL" smtClean="0"/>
-              <a:t>‹#›</a:t>
+              <a:t>‹nr.›</a:t>
             </a:fld>
             <a:endParaRPr lang="nl-NL"/>
           </a:p>
@@ -2689,7 +2690,7 @@
           <a:p>
             <a:fld id="{B2E4F3CE-5921-4ADD-9964-2DE7A47474AF}" type="datetimeFigureOut">
               <a:rPr lang="nl-NL" smtClean="0"/>
-              <a:t>23-5-2018</a:t>
+              <a:t>24-5-2018</a:t>
             </a:fld>
             <a:endParaRPr lang="nl-NL"/>
           </a:p>
@@ -2731,7 +2732,7 @@
           <a:p>
             <a:fld id="{F9A998D0-4466-47BE-85E2-8C9E3531AFF1}" type="slidenum">
               <a:rPr lang="nl-NL" smtClean="0"/>
-              <a:t>‹#›</a:t>
+              <a:t>‹nr.›</a:t>
             </a:fld>
             <a:endParaRPr lang="nl-NL"/>
           </a:p>
@@ -2899,7 +2900,7 @@
           <a:p>
             <a:fld id="{B2E4F3CE-5921-4ADD-9964-2DE7A47474AF}" type="datetimeFigureOut">
               <a:rPr lang="nl-NL" smtClean="0"/>
-              <a:t>23-5-2018</a:t>
+              <a:t>24-5-2018</a:t>
             </a:fld>
             <a:endParaRPr lang="nl-NL"/>
           </a:p>
@@ -2973,7 +2974,7 @@
           <a:p>
             <a:fld id="{F9A998D0-4466-47BE-85E2-8C9E3531AFF1}" type="slidenum">
               <a:rPr lang="nl-NL" smtClean="0"/>
-              <a:t>‹#›</a:t>
+              <a:t>‹nr.›</a:t>
             </a:fld>
             <a:endParaRPr lang="nl-NL" dirty="0"/>
           </a:p>
@@ -3022,7 +3023,7 @@
           <p:cNvPr id="8" name="Picture 7" descr="A group of people in a room&#10;&#10;Description generated with very high confidence">
             <a:extLst>
               <a:ext uri="{FF2B5EF4-FFF2-40B4-BE49-F238E27FC236}">
-                <a16:creationId xmlns:a16="http://schemas.microsoft.com/office/drawing/2014/main" id="{E8DF0BB6-DCAB-4E9C-8305-3C25099E8419}"/>
+                <a16:creationId xmlns:a16="http://schemas.microsoft.com/office/drawing/2014/main" xmlns="" id="{E8DF0BB6-DCAB-4E9C-8305-3C25099E8419}"/>
               </a:ext>
             </a:extLst>
           </p:cNvPr>
@@ -3456,7 +3457,7 @@
           <p:cNvPr id="2" name="Title 1">
             <a:extLst>
               <a:ext uri="{FF2B5EF4-FFF2-40B4-BE49-F238E27FC236}">
-                <a16:creationId xmlns:a16="http://schemas.microsoft.com/office/drawing/2014/main" id="{DFB35624-C45A-4417-8484-F487F43C3428}"/>
+                <a16:creationId xmlns:a16="http://schemas.microsoft.com/office/drawing/2014/main" xmlns="" id="{DFB35624-C45A-4417-8484-F487F43C3428}"/>
               </a:ext>
             </a:extLst>
           </p:cNvPr>
@@ -3484,7 +3485,7 @@
           <p:cNvPr id="3" name="Text Placeholder 2">
             <a:extLst>
               <a:ext uri="{FF2B5EF4-FFF2-40B4-BE49-F238E27FC236}">
-                <a16:creationId xmlns:a16="http://schemas.microsoft.com/office/drawing/2014/main" id="{F477C6E4-8C06-4C8A-8A0C-C1EDED58155D}"/>
+                <a16:creationId xmlns:a16="http://schemas.microsoft.com/office/drawing/2014/main" xmlns="" id="{F477C6E4-8C06-4C8A-8A0C-C1EDED58155D}"/>
               </a:ext>
             </a:extLst>
           </p:cNvPr>
@@ -3517,6 +3518,13 @@
   <p:clrMapOvr>
     <a:masterClrMapping/>
   </p:clrMapOvr>
+  <p:timing>
+    <p:tnLst>
+      <p:par>
+        <p:cTn id="1" dur="indefinite" restart="never" nodeType="tmRoot"/>
+      </p:par>
+    </p:tnLst>
+  </p:timing>
 </p:sld>
 </file>
 
@@ -3550,6 +3558,240 @@
         <p:spPr/>
         <p:txBody>
           <a:bodyPr>
+            <a:normAutofit fontScale="90000"/>
+          </a:bodyPr>
+          <a:lstStyle/>
+          <a:p>
+            <a:r>
+              <a:rPr lang="en-US" dirty="0" err="1"/>
+              <a:t>Resultaten</a:t>
+            </a:r>
+            <a:r>
+              <a:rPr lang="en-US" dirty="0"/>
+              <a:t/>
+            </a:r>
+            <a:br>
+              <a:rPr lang="en-US" dirty="0"/>
+            </a:br>
+            <a:endParaRPr lang="en-US" dirty="0"/>
+          </a:p>
+        </p:txBody>
+      </p:sp>
+      <p:sp>
+        <p:nvSpPr>
+          <p:cNvPr id="3" name="Content Placeholder 2"/>
+          <p:cNvSpPr>
+            <a:spLocks noGrp="1"/>
+          </p:cNvSpPr>
+          <p:nvPr>
+            <p:ph idx="1"/>
+          </p:nvPr>
+        </p:nvSpPr>
+        <p:spPr/>
+        <p:txBody>
+          <a:bodyPr>
+            <a:normAutofit fontScale="92500" lnSpcReduction="10000"/>
+          </a:bodyPr>
+          <a:lstStyle/>
+          <a:p>
+            <a:r>
+              <a:rPr lang="en-US" dirty="0" err="1"/>
+              <a:t>Hillclimber</a:t>
+            </a:r>
+            <a:r>
+              <a:rPr lang="en-US" dirty="0"/>
+              <a:t>/simulated annealing</a:t>
+            </a:r>
+          </a:p>
+          <a:p>
+            <a:pPr lvl="1"/>
+            <a:r>
+              <a:rPr lang="en-US" dirty="0"/>
+              <a:t>Random sampling</a:t>
+            </a:r>
+          </a:p>
+          <a:p>
+            <a:pPr lvl="1"/>
+            <a:r>
+              <a:rPr lang="en-US" dirty="0"/>
+              <a:t>Score </a:t>
+            </a:r>
+            <a:r>
+              <a:rPr lang="en-US" dirty="0" err="1"/>
+              <a:t>vs</a:t>
+            </a:r>
+            <a:r>
+              <a:rPr lang="en-US" dirty="0"/>
+              <a:t> </a:t>
+            </a:r>
+            <a:r>
+              <a:rPr lang="en-US" dirty="0" err="1"/>
+              <a:t>iteraties</a:t>
+            </a:r>
+            <a:endParaRPr lang="en-US" dirty="0"/>
+          </a:p>
+          <a:p>
+            <a:r>
+              <a:rPr lang="en-US" dirty="0"/>
+              <a:t>Genetic</a:t>
+            </a:r>
+          </a:p>
+          <a:p>
+            <a:pPr lvl="1"/>
+            <a:r>
+              <a:rPr lang="en-US" dirty="0"/>
+              <a:t>Random sampling</a:t>
+            </a:r>
+          </a:p>
+          <a:p>
+            <a:pPr lvl="1"/>
+            <a:r>
+              <a:rPr lang="en-US" dirty="0"/>
+              <a:t>Score </a:t>
+            </a:r>
+            <a:r>
+              <a:rPr lang="en-US" dirty="0" err="1"/>
+              <a:t>vs</a:t>
+            </a:r>
+            <a:r>
+              <a:rPr lang="en-US" dirty="0"/>
+              <a:t> </a:t>
+            </a:r>
+            <a:r>
+              <a:rPr lang="en-US" dirty="0" err="1"/>
+              <a:t>generatie</a:t>
+            </a:r>
+            <a:endParaRPr lang="en-US" dirty="0"/>
+          </a:p>
+          <a:p>
+            <a:r>
+              <a:rPr lang="en-US" dirty="0" err="1"/>
+              <a:t>Hybride</a:t>
+            </a:r>
+            <a:endParaRPr lang="en-US" dirty="0"/>
+          </a:p>
+          <a:p>
+            <a:pPr lvl="1"/>
+            <a:r>
+              <a:rPr lang="en-US" dirty="0" err="1"/>
+              <a:t>Tussen</a:t>
+            </a:r>
+            <a:r>
+              <a:rPr lang="en-US" dirty="0"/>
+              <a:t> score </a:t>
+            </a:r>
+            <a:r>
+              <a:rPr lang="en-US" dirty="0" err="1"/>
+              <a:t>na</a:t>
+            </a:r>
+            <a:r>
+              <a:rPr lang="en-US" dirty="0"/>
+              <a:t> </a:t>
+            </a:r>
+            <a:r>
+              <a:rPr lang="en-US" dirty="0" err="1"/>
+              <a:t>elke</a:t>
+            </a:r>
+            <a:r>
+              <a:rPr lang="en-US" dirty="0"/>
+              <a:t> </a:t>
+            </a:r>
+            <a:r>
+              <a:rPr lang="en-US" dirty="0" err="1"/>
+              <a:t>algortime</a:t>
+            </a:r>
+            <a:endParaRPr lang="en-US" dirty="0"/>
+          </a:p>
+          <a:p>
+            <a:pPr lvl="1"/>
+            <a:r>
+              <a:rPr lang="en-US" dirty="0"/>
+              <a:t>Random sampling</a:t>
+            </a:r>
+          </a:p>
+          <a:p>
+            <a:pPr lvl="1"/>
+            <a:r>
+              <a:rPr lang="en-US" dirty="0"/>
+              <a:t>Score </a:t>
+            </a:r>
+            <a:r>
+              <a:rPr lang="en-US" dirty="0" err="1"/>
+              <a:t>vs</a:t>
+            </a:r>
+            <a:r>
+              <a:rPr lang="en-US" dirty="0"/>
+              <a:t> </a:t>
+            </a:r>
+            <a:r>
+              <a:rPr lang="en-US" dirty="0" err="1"/>
+              <a:t>iteraties</a:t>
+            </a:r>
+            <a:r>
+              <a:rPr lang="en-US" dirty="0"/>
+              <a:t> </a:t>
+            </a:r>
+          </a:p>
+          <a:p>
+            <a:pPr lvl="1"/>
+            <a:endParaRPr lang="en-US" dirty="0"/>
+          </a:p>
+          <a:p>
+            <a:pPr lvl="1"/>
+            <a:endParaRPr lang="en-US" dirty="0"/>
+          </a:p>
+        </p:txBody>
+      </p:sp>
+    </p:spTree>
+    <p:extLst>
+      <p:ext uri="{BB962C8B-B14F-4D97-AF65-F5344CB8AC3E}">
+        <p14:creationId xmlns:p14="http://schemas.microsoft.com/office/powerpoint/2010/main" val="4264903066"/>
+      </p:ext>
+    </p:extLst>
+  </p:cSld>
+  <p:clrMapOvr>
+    <a:masterClrMapping/>
+  </p:clrMapOvr>
+  <p:timing>
+    <p:tnLst>
+      <p:par>
+        <p:cTn id="1" dur="indefinite" restart="never" nodeType="tmRoot"/>
+      </p:par>
+    </p:tnLst>
+  </p:timing>
+</p:sld>
+</file>
+
+<file path=ppt/slides/slide11.xml><?xml version="1.0" encoding="utf-8"?>
+<p:sld xmlns:a="http://schemas.openxmlformats.org/drawingml/2006/main" xmlns:r="http://schemas.openxmlformats.org/officeDocument/2006/relationships" xmlns:p="http://schemas.openxmlformats.org/presentationml/2006/main">
+  <p:cSld>
+    <p:spTree>
+      <p:nvGrpSpPr>
+        <p:cNvPr id="1" name=""/>
+        <p:cNvGrpSpPr/>
+        <p:nvPr/>
+      </p:nvGrpSpPr>
+      <p:grpSpPr>
+        <a:xfrm>
+          <a:off x="0" y="0"/>
+          <a:ext cx="0" cy="0"/>
+          <a:chOff x="0" y="0"/>
+          <a:chExt cx="0" cy="0"/>
+        </a:xfrm>
+      </p:grpSpPr>
+      <p:sp>
+        <p:nvSpPr>
+          <p:cNvPr id="2" name="Title 1"/>
+          <p:cNvSpPr>
+            <a:spLocks noGrp="1"/>
+          </p:cNvSpPr>
+          <p:nvPr>
+            <p:ph type="title"/>
+          </p:nvPr>
+        </p:nvSpPr>
+        <p:spPr/>
+        <p:txBody>
+          <a:bodyPr>
             <a:normAutofit/>
           </a:bodyPr>
           <a:lstStyle/>
@@ -3648,6 +3890,13 @@
   <p:clrMapOvr>
     <a:masterClrMapping/>
   </p:clrMapOvr>
+  <p:timing>
+    <p:tnLst>
+      <p:par>
+        <p:cTn id="1" dur="indefinite" restart="never" nodeType="tmRoot"/>
+      </p:par>
+    </p:tnLst>
+  </p:timing>
 </p:sld>
 </file>
 
@@ -3673,7 +3922,7 @@
           <p:cNvPr id="2" name="Title 1">
             <a:extLst>
               <a:ext uri="{FF2B5EF4-FFF2-40B4-BE49-F238E27FC236}">
-                <a16:creationId xmlns:a16="http://schemas.microsoft.com/office/drawing/2014/main" id="{9786429D-A3FD-4545-A82A-7A300CE7816F}"/>
+                <a16:creationId xmlns:a16="http://schemas.microsoft.com/office/drawing/2014/main" xmlns="" id="{9786429D-A3FD-4545-A82A-7A300CE7816F}"/>
               </a:ext>
             </a:extLst>
           </p:cNvPr>
@@ -3687,21 +3936,15 @@
         <p:spPr/>
         <p:txBody>
           <a:bodyPr>
-            <a:normAutofit fontScale="90000"/>
+            <a:normAutofit/>
           </a:bodyPr>
           <a:lstStyle/>
           <a:p>
             <a:r>
-              <a:rPr lang="nl-NL" dirty="0"/>
-              <a:t>Introductie</a:t>
-            </a:r>
-            <a:br>
-              <a:rPr lang="nl-NL" dirty="0"/>
-            </a:br>
-            <a:r>
-              <a:rPr lang="nl-NL" dirty="0"/>
-              <a:t>Gegevens</a:t>
-            </a:r>
+              <a:rPr lang="nl-NL" dirty="0" smtClean="0"/>
+              <a:t>Introductie: Gegevens</a:t>
+            </a:r>
+            <a:endParaRPr lang="nl-NL" dirty="0"/>
           </a:p>
         </p:txBody>
       </p:sp>
@@ -3710,7 +3953,7 @@
           <p:cNvPr id="3" name="Content Placeholder 2">
             <a:extLst>
               <a:ext uri="{FF2B5EF4-FFF2-40B4-BE49-F238E27FC236}">
-                <a16:creationId xmlns:a16="http://schemas.microsoft.com/office/drawing/2014/main" id="{8813E008-5B7D-426C-BE51-1EB75C5AE26D}"/>
+                <a16:creationId xmlns:a16="http://schemas.microsoft.com/office/drawing/2014/main" xmlns="" id="{8813E008-5B7D-426C-BE51-1EB75C5AE26D}"/>
               </a:ext>
             </a:extLst>
           </p:cNvPr>
@@ -3729,7 +3972,7 @@
         </p:spPr>
         <p:txBody>
           <a:bodyPr>
-            <a:normAutofit lnSpcReduction="10000"/>
+            <a:normAutofit fontScale="92500" lnSpcReduction="20000"/>
           </a:bodyPr>
           <a:lstStyle/>
           <a:p>
@@ -3827,8 +4070,52 @@
           <a:p>
             <a:r>
               <a:rPr lang="nl-NL" dirty="0"/>
-              <a:t>5 tijdsloten</a:t>
-            </a:r>
+              <a:t>5 </a:t>
+            </a:r>
+            <a:r>
+              <a:rPr lang="nl-NL" dirty="0" smtClean="0"/>
+              <a:t>tijdsloten</a:t>
+            </a:r>
+          </a:p>
+          <a:p>
+            <a:endParaRPr lang="nl-NL" dirty="0"/>
+          </a:p>
+          <a:p>
+            <a:r>
+              <a:rPr lang="nl-NL" dirty="0"/>
+              <a:t>145 zaalsloten: 5 (dagen) </a:t>
+            </a:r>
+            <a:r>
+              <a:rPr lang="nl-NL" dirty="0" smtClean="0"/>
+              <a:t>* </a:t>
+            </a:r>
+            <a:r>
+              <a:rPr lang="nl-NL" dirty="0"/>
+              <a:t>7 (zalen</a:t>
+            </a:r>
+            <a:r>
+              <a:rPr lang="nl-NL" dirty="0" smtClean="0"/>
+              <a:t>)</a:t>
+            </a:r>
+            <a:r>
+              <a:rPr lang="nl-NL" dirty="0"/>
+              <a:t> * 4 (tijdsloten)</a:t>
+            </a:r>
+            <a:r>
+              <a:rPr lang="nl-NL" dirty="0" smtClean="0"/>
+              <a:t> </a:t>
+            </a:r>
+            <a:r>
+              <a:rPr lang="nl-NL" dirty="0"/>
+              <a:t>+ 5 (avondsloten) </a:t>
+            </a:r>
+            <a:endParaRPr lang="nl-NL" dirty="0" smtClean="0"/>
+          </a:p>
+          <a:p>
+            <a:pPr marL="0" indent="0">
+              <a:buNone/>
+            </a:pPr>
+            <a:endParaRPr lang="nl-NL" dirty="0"/>
           </a:p>
           <a:p>
             <a:endParaRPr lang="nl-NL" dirty="0"/>
@@ -3840,7 +4127,7 @@
           <p:cNvPr id="4" name="Right Brace 3">
             <a:extLst>
               <a:ext uri="{FF2B5EF4-FFF2-40B4-BE49-F238E27FC236}">
-                <a16:creationId xmlns:a16="http://schemas.microsoft.com/office/drawing/2014/main" id="{6E64EA35-C3BC-4000-9318-44F7982588DD}"/>
+                <a16:creationId xmlns:a16="http://schemas.microsoft.com/office/drawing/2014/main" xmlns="" id="{6E64EA35-C3BC-4000-9318-44F7982588DD}"/>
               </a:ext>
             </a:extLst>
           </p:cNvPr>
@@ -3898,6 +4185,13 @@
   <p:clrMapOvr>
     <a:masterClrMapping/>
   </p:clrMapOvr>
+  <p:timing>
+    <p:tnLst>
+      <p:par>
+        <p:cTn id="1" dur="indefinite" restart="never" nodeType="tmRoot"/>
+      </p:par>
+    </p:tnLst>
+  </p:timing>
 </p:sld>
 </file>
 
@@ -3923,7 +4217,7 @@
           <p:cNvPr id="2" name="Title 1">
             <a:extLst>
               <a:ext uri="{FF2B5EF4-FFF2-40B4-BE49-F238E27FC236}">
-                <a16:creationId xmlns:a16="http://schemas.microsoft.com/office/drawing/2014/main" id="{460B92D0-C3FC-4816-BD32-0EB0C8AE980D}"/>
+                <a16:creationId xmlns:a16="http://schemas.microsoft.com/office/drawing/2014/main" xmlns="" id="{460B92D0-C3FC-4816-BD32-0EB0C8AE980D}"/>
               </a:ext>
             </a:extLst>
           </p:cNvPr>
@@ -3942,21 +4236,15 @@
         </p:spPr>
         <p:txBody>
           <a:bodyPr>
-            <a:normAutofit fontScale="90000"/>
+            <a:normAutofit/>
           </a:bodyPr>
           <a:lstStyle/>
           <a:p>
             <a:r>
-              <a:rPr lang="nl-NL" dirty="0"/>
-              <a:t>Introductie</a:t>
-            </a:r>
-            <a:br>
-              <a:rPr lang="nl-NL" dirty="0"/>
-            </a:br>
-            <a:r>
-              <a:rPr lang="nl-NL" dirty="0"/>
-              <a:t>Rooster</a:t>
-            </a:r>
+              <a:rPr lang="nl-NL" dirty="0" smtClean="0"/>
+              <a:t>Introductie: Rooster</a:t>
+            </a:r>
+            <a:endParaRPr lang="nl-NL" dirty="0"/>
           </a:p>
         </p:txBody>
       </p:sp>
@@ -3965,7 +4253,7 @@
           <p:cNvPr id="3" name="Content Placeholder 2">
             <a:extLst>
               <a:ext uri="{FF2B5EF4-FFF2-40B4-BE49-F238E27FC236}">
-                <a16:creationId xmlns:a16="http://schemas.microsoft.com/office/drawing/2014/main" id="{39DE8E62-E349-4FAC-AC22-7E063D842504}"/>
+                <a16:creationId xmlns:a16="http://schemas.microsoft.com/office/drawing/2014/main" xmlns="" id="{39DE8E62-E349-4FAC-AC22-7E063D842504}"/>
               </a:ext>
             </a:extLst>
           </p:cNvPr>
@@ -4010,6 +4298,13 @@
   <p:clrMapOvr>
     <a:masterClrMapping/>
   </p:clrMapOvr>
+  <p:timing>
+    <p:tnLst>
+      <p:par>
+        <p:cTn id="1" dur="indefinite" restart="never" nodeType="tmRoot"/>
+      </p:par>
+    </p:tnLst>
+  </p:timing>
 </p:sld>
 </file>
 
@@ -4043,19 +4338,20 @@
         <p:spPr/>
         <p:txBody>
           <a:bodyPr>
-            <a:normAutofit fontScale="90000"/>
+            <a:normAutofit/>
           </a:bodyPr>
           <a:lstStyle/>
           <a:p>
             <a:r>
-              <a:rPr lang="en-US" dirty="0" err="1"/>
+              <a:rPr lang="en-US" dirty="0" err="1" smtClean="0"/>
               <a:t>Introductie</a:t>
             </a:r>
-            <a:br>
-              <a:rPr lang="en-US" dirty="0"/>
-            </a:br>
-            <a:r>
-              <a:rPr lang="en-US" dirty="0" err="1"/>
+            <a:r>
+              <a:rPr lang="en-US" dirty="0" smtClean="0"/>
+              <a:t>: </a:t>
+            </a:r>
+            <a:r>
+              <a:rPr lang="en-US" dirty="0" err="1" smtClean="0"/>
               <a:t>Scorebepaling</a:t>
             </a:r>
             <a:endParaRPr lang="en-US" dirty="0"/>
@@ -4080,8 +4376,12 @@
           <a:lstStyle/>
           <a:p>
             <a:r>
-              <a:rPr lang="en-US" dirty="0"/>
-              <a:t>Score = 1000 + </a:t>
+              <a:rPr lang="en-US" b="1" dirty="0"/>
+              <a:t>Score</a:t>
+            </a:r>
+            <a:r>
+              <a:rPr lang="en-US" dirty="0"/>
+              <a:t> = 1000 + </a:t>
             </a:r>
             <a:r>
               <a:rPr lang="en-US" dirty="0" err="1"/>
@@ -4113,42 +4413,42 @@
           <a:p>
             <a:pPr lvl="1"/>
             <a:r>
-              <a:rPr lang="en-US" dirty="0"/>
+              <a:rPr lang="en-US" b="1" i="0" dirty="0"/>
               <a:t>20 </a:t>
             </a:r>
             <a:r>
-              <a:rPr lang="en-US" dirty="0" err="1"/>
+              <a:rPr lang="en-US" b="1" i="0" dirty="0" err="1"/>
               <a:t>punten</a:t>
             </a:r>
             <a:r>
-              <a:rPr lang="en-US" dirty="0"/>
+              <a:rPr lang="en-US" b="1" i="0" dirty="0"/>
               <a:t> </a:t>
             </a:r>
             <a:r>
-              <a:rPr lang="en-US" dirty="0" err="1"/>
+              <a:rPr lang="en-US" i="0" dirty="0" err="1"/>
               <a:t>voor</a:t>
             </a:r>
             <a:r>
-              <a:rPr lang="en-US" dirty="0"/>
+              <a:rPr lang="en-US" i="0" dirty="0"/>
               <a:t> </a:t>
             </a:r>
             <a:r>
-              <a:rPr lang="en-US" dirty="0" err="1"/>
+              <a:rPr lang="en-US" i="0" dirty="0" err="1"/>
               <a:t>goede</a:t>
             </a:r>
             <a:r>
-              <a:rPr lang="en-US" dirty="0"/>
+              <a:rPr lang="en-US" i="0" dirty="0"/>
               <a:t> </a:t>
             </a:r>
             <a:r>
-              <a:rPr lang="en-US" dirty="0" err="1"/>
+              <a:rPr lang="en-US" i="0" dirty="0" err="1"/>
               <a:t>weekindeling</a:t>
             </a:r>
-            <a:endParaRPr lang="en-US" dirty="0"/>
+            <a:endParaRPr lang="en-US" i="0" dirty="0"/>
           </a:p>
           <a:p>
             <a:pPr lvl="1"/>
-            <a:endParaRPr lang="en-US" dirty="0"/>
+            <a:endParaRPr lang="en-US" i="0" dirty="0"/>
           </a:p>
           <a:p>
             <a:r>
@@ -4163,136 +4463,139 @@
           <a:p>
             <a:pPr lvl="1"/>
             <a:r>
-              <a:rPr lang="en-US" dirty="0"/>
+              <a:rPr lang="en-US" b="1" i="0" dirty="0"/>
               <a:t>1 punt </a:t>
             </a:r>
             <a:r>
-              <a:rPr lang="en-US" dirty="0" err="1"/>
+              <a:rPr lang="en-US" i="0" dirty="0" err="1"/>
               <a:t>voor</a:t>
             </a:r>
             <a:r>
-              <a:rPr lang="en-US" dirty="0"/>
+              <a:rPr lang="en-US" i="0" dirty="0"/>
               <a:t> </a:t>
             </a:r>
             <a:r>
-              <a:rPr lang="en-US" dirty="0" err="1"/>
+              <a:rPr lang="en-US" i="0" dirty="0" err="1"/>
               <a:t>iedere</a:t>
             </a:r>
             <a:r>
-              <a:rPr lang="en-US" dirty="0"/>
+              <a:rPr lang="en-US" i="0" dirty="0"/>
               <a:t> student die </a:t>
             </a:r>
             <a:r>
-              <a:rPr lang="en-US" dirty="0" err="1"/>
+              <a:rPr lang="en-US" i="0" dirty="0" err="1"/>
               <a:t>niet</a:t>
             </a:r>
             <a:r>
-              <a:rPr lang="en-US" dirty="0"/>
+              <a:rPr lang="en-US" i="0" dirty="0"/>
               <a:t> in de </a:t>
             </a:r>
             <a:r>
-              <a:rPr lang="en-US" dirty="0" err="1"/>
+              <a:rPr lang="en-US" i="0" dirty="0" err="1"/>
               <a:t>zaal</a:t>
             </a:r>
             <a:r>
-              <a:rPr lang="en-US" dirty="0"/>
+              <a:rPr lang="en-US" i="0" dirty="0"/>
               <a:t> past</a:t>
             </a:r>
           </a:p>
           <a:p>
             <a:pPr lvl="1"/>
             <a:r>
-              <a:rPr lang="en-US" dirty="0"/>
-              <a:t>1 punt per </a:t>
-            </a:r>
-            <a:r>
-              <a:rPr lang="en-US" dirty="0" err="1"/>
+              <a:rPr lang="en-US" b="1" i="0" dirty="0"/>
+              <a:t>1 punt </a:t>
+            </a:r>
+            <a:r>
+              <a:rPr lang="en-US" i="0" dirty="0"/>
+              <a:t>per </a:t>
+            </a:r>
+            <a:r>
+              <a:rPr lang="en-US" i="0" dirty="0" err="1"/>
               <a:t>roosterconflict</a:t>
             </a:r>
             <a:r>
-              <a:rPr lang="en-US" dirty="0"/>
+              <a:rPr lang="en-US" i="0" dirty="0"/>
               <a:t> per student</a:t>
             </a:r>
           </a:p>
           <a:p>
             <a:pPr lvl="1"/>
             <a:r>
-              <a:rPr lang="en-US" dirty="0"/>
+              <a:rPr lang="en-US" b="1" i="0" dirty="0"/>
               <a:t>10, 20 of 30 </a:t>
             </a:r>
             <a:r>
-              <a:rPr lang="en-US" dirty="0" err="1"/>
+              <a:rPr lang="en-US" b="1" i="0" dirty="0" err="1"/>
               <a:t>punten</a:t>
             </a:r>
             <a:r>
-              <a:rPr lang="en-US" dirty="0"/>
+              <a:rPr lang="en-US" b="1" i="0" dirty="0"/>
               <a:t> </a:t>
             </a:r>
             <a:r>
-              <a:rPr lang="en-US" dirty="0" err="1"/>
+              <a:rPr lang="en-US" i="0" dirty="0" err="1"/>
               <a:t>voor</a:t>
             </a:r>
             <a:r>
-              <a:rPr lang="en-US" dirty="0"/>
+              <a:rPr lang="en-US" i="0" dirty="0"/>
               <a:t> </a:t>
             </a:r>
             <a:r>
-              <a:rPr lang="en-US" dirty="0" err="1"/>
+              <a:rPr lang="en-US" i="0" dirty="0" err="1"/>
               <a:t>slechte</a:t>
             </a:r>
             <a:r>
-              <a:rPr lang="en-US" dirty="0"/>
+              <a:rPr lang="en-US" i="0" dirty="0"/>
               <a:t> </a:t>
             </a:r>
             <a:r>
-              <a:rPr lang="en-US" dirty="0" err="1"/>
+              <a:rPr lang="en-US" i="0" dirty="0" err="1"/>
               <a:t>weekindeling</a:t>
             </a:r>
-            <a:endParaRPr lang="en-US" dirty="0"/>
+            <a:endParaRPr lang="en-US" i="0" dirty="0"/>
           </a:p>
           <a:p>
             <a:pPr lvl="1"/>
             <a:r>
-              <a:rPr lang="en-US" dirty="0"/>
+              <a:rPr lang="en-US" b="1" i="0" dirty="0"/>
               <a:t>50 </a:t>
             </a:r>
             <a:r>
-              <a:rPr lang="en-US" dirty="0" err="1"/>
+              <a:rPr lang="en-US" b="1" i="0" dirty="0" err="1"/>
               <a:t>punten</a:t>
             </a:r>
             <a:r>
-              <a:rPr lang="en-US" dirty="0"/>
+              <a:rPr lang="en-US" b="1" i="0" dirty="0"/>
               <a:t> </a:t>
             </a:r>
             <a:r>
-              <a:rPr lang="en-US" dirty="0" err="1"/>
+              <a:rPr lang="en-US" i="0" dirty="0" err="1"/>
               <a:t>voor</a:t>
             </a:r>
             <a:r>
-              <a:rPr lang="en-US" dirty="0"/>
+              <a:rPr lang="en-US" i="0" dirty="0"/>
               <a:t> </a:t>
             </a:r>
             <a:r>
-              <a:rPr lang="en-US" dirty="0" err="1"/>
+              <a:rPr lang="en-US" i="0" dirty="0" err="1"/>
               <a:t>laat</a:t>
             </a:r>
             <a:r>
-              <a:rPr lang="en-US" dirty="0"/>
+              <a:rPr lang="en-US" i="0" dirty="0"/>
               <a:t> </a:t>
             </a:r>
             <a:r>
-              <a:rPr lang="en-US" dirty="0" err="1"/>
+              <a:rPr lang="en-US" i="0" dirty="0" err="1"/>
               <a:t>tijdslot</a:t>
             </a:r>
             <a:r>
-              <a:rPr lang="en-US"/>
+              <a:rPr lang="en-US" i="0" dirty="0"/>
               <a:t> (17:00-19:00)</a:t>
             </a:r>
-            <a:endParaRPr lang="en-US" dirty="0"/>
           </a:p>
           <a:p>
             <a:pPr lvl="1"/>
-            <a:endParaRPr lang="en-US" dirty="0"/>
+            <a:endParaRPr lang="en-US" i="0" dirty="0"/>
           </a:p>
         </p:txBody>
       </p:sp>
@@ -4306,6 +4609,13 @@
   <p:clrMapOvr>
     <a:masterClrMapping/>
   </p:clrMapOvr>
+  <p:timing>
+    <p:tnLst>
+      <p:par>
+        <p:cTn id="1" dur="indefinite" restart="never" nodeType="tmRoot"/>
+      </p:par>
+    </p:tnLst>
+  </p:timing>
 </p:sld>
 </file>
 
@@ -4342,8 +4652,16 @@
           <a:lstStyle/>
           <a:p>
             <a:r>
-              <a:rPr lang="en-US" dirty="0" err="1"/>
-              <a:t>Statespace</a:t>
+              <a:rPr lang="en-US" dirty="0" err="1" smtClean="0"/>
+              <a:t>Introductie</a:t>
+            </a:r>
+            <a:r>
+              <a:rPr lang="en-US" dirty="0" smtClean="0"/>
+              <a:t>: </a:t>
+            </a:r>
+            <a:r>
+              <a:rPr lang="en-US" dirty="0" err="1" smtClean="0"/>
+              <a:t>Grenzen</a:t>
             </a:r>
             <a:endParaRPr lang="en-US" dirty="0"/>
           </a:p>
@@ -4359,13 +4677,20 @@
             <p:ph idx="1"/>
           </p:nvPr>
         </p:nvSpPr>
-        <p:spPr/>
-        <p:txBody>
-          <a:bodyPr/>
+        <p:spPr>
+          <a:xfrm>
+            <a:off x="1371600" y="1897039"/>
+            <a:ext cx="9601200" cy="4446611"/>
+          </a:xfrm>
+        </p:spPr>
+        <p:txBody>
+          <a:bodyPr>
+            <a:normAutofit/>
+          </a:bodyPr>
           <a:lstStyle/>
           <a:p>
             <a:r>
-              <a:rPr lang="en-US" dirty="0" err="1"/>
+              <a:rPr lang="en-US" dirty="0" err="1" smtClean="0"/>
               <a:t>Bovengrens</a:t>
             </a:r>
             <a:endParaRPr lang="en-US" dirty="0"/>
@@ -4373,33 +4698,296 @@
           <a:p>
             <a:pPr lvl="1"/>
             <a:r>
-              <a:rPr lang="en-US" dirty="0" err="1"/>
+              <a:rPr lang="en-US" i="0" dirty="0" err="1" smtClean="0"/>
               <a:t>Theorestisch</a:t>
             </a:r>
+            <a:endParaRPr lang="en-US" i="0" dirty="0" smtClean="0"/>
+          </a:p>
+          <a:p>
+            <a:pPr marL="530352" lvl="1" indent="0">
+              <a:buNone/>
+            </a:pPr>
+            <a:r>
+              <a:rPr lang="en-US" i="0" dirty="0"/>
+              <a:t>		</a:t>
+            </a:r>
+            <a:r>
+              <a:rPr lang="en-US" sz="2000" b="1" i="0" dirty="0" smtClean="0"/>
+              <a:t>2400</a:t>
+            </a:r>
+            <a:r>
+              <a:rPr lang="en-US" sz="2000" i="0" dirty="0" smtClean="0"/>
+              <a:t> = 1000 (</a:t>
+            </a:r>
+            <a:r>
+              <a:rPr lang="en-US" sz="2000" i="0" dirty="0" err="1" smtClean="0"/>
+              <a:t>geldig</a:t>
+            </a:r>
+            <a:r>
+              <a:rPr lang="en-US" sz="2000" i="0" dirty="0" smtClean="0"/>
+              <a:t> rooster) + 70 (</a:t>
+            </a:r>
+            <a:r>
+              <a:rPr lang="en-US" sz="2000" i="0" dirty="0" err="1" smtClean="0"/>
+              <a:t>weekactiviteiten</a:t>
+            </a:r>
+            <a:r>
+              <a:rPr lang="en-US" sz="2000" i="0" dirty="0" smtClean="0"/>
+              <a:t>)* 20 (</a:t>
+            </a:r>
+            <a:r>
+              <a:rPr lang="en-US" sz="2000" i="0" dirty="0" err="1" smtClean="0"/>
+              <a:t>bonuspunten</a:t>
+            </a:r>
+            <a:r>
+              <a:rPr lang="en-US" sz="2000" i="0" dirty="0" smtClean="0"/>
+              <a:t>)</a:t>
+            </a:r>
+            <a:endParaRPr lang="en-US" sz="2000" i="0" dirty="0"/>
+          </a:p>
+          <a:p>
+            <a:pPr lvl="1"/>
+            <a:r>
+              <a:rPr lang="en-US" i="0" dirty="0" err="1" smtClean="0"/>
+              <a:t>Aangepast</a:t>
+            </a:r>
+            <a:endParaRPr lang="en-US" i="0" dirty="0" smtClean="0"/>
+          </a:p>
+          <a:p>
+            <a:pPr marL="530352" lvl="1" indent="0">
+              <a:buNone/>
+            </a:pPr>
+            <a:r>
+              <a:rPr lang="en-US" i="0" dirty="0" smtClean="0"/>
+              <a:t>	</a:t>
+            </a:r>
+            <a:r>
+              <a:rPr lang="en-US" i="0" dirty="0"/>
+              <a:t>	</a:t>
+            </a:r>
+            <a:r>
+              <a:rPr lang="en-US" sz="2000" b="1" i="0" dirty="0" smtClean="0">
+                <a:solidFill>
+                  <a:srgbClr val="335B74"/>
+                </a:solidFill>
+              </a:rPr>
+              <a:t>1800</a:t>
+            </a:r>
+            <a:r>
+              <a:rPr lang="en-US" sz="2000" i="0" dirty="0" smtClean="0">
+                <a:solidFill>
+                  <a:srgbClr val="335B74"/>
+                </a:solidFill>
+              </a:rPr>
+              <a:t> </a:t>
+            </a:r>
+            <a:r>
+              <a:rPr lang="en-US" sz="2000" i="0" dirty="0">
+                <a:solidFill>
+                  <a:srgbClr val="335B74"/>
+                </a:solidFill>
+              </a:rPr>
+              <a:t>= 1000 (</a:t>
+            </a:r>
+            <a:r>
+              <a:rPr lang="en-US" sz="2000" i="0" dirty="0" err="1">
+                <a:solidFill>
+                  <a:srgbClr val="335B74"/>
+                </a:solidFill>
+              </a:rPr>
+              <a:t>geldig</a:t>
+            </a:r>
+            <a:r>
+              <a:rPr lang="en-US" sz="2000" i="0" dirty="0">
+                <a:solidFill>
+                  <a:srgbClr val="335B74"/>
+                </a:solidFill>
+              </a:rPr>
+              <a:t> rooster) + </a:t>
+            </a:r>
+            <a:r>
+              <a:rPr lang="en-US" sz="2000" i="0" dirty="0" smtClean="0">
+                <a:solidFill>
+                  <a:srgbClr val="335B74"/>
+                </a:solidFill>
+              </a:rPr>
+              <a:t>40 </a:t>
+            </a:r>
+            <a:r>
+              <a:rPr lang="en-US" sz="2000" i="0" dirty="0">
+                <a:solidFill>
+                  <a:srgbClr val="335B74"/>
+                </a:solidFill>
+              </a:rPr>
+              <a:t>(</a:t>
+            </a:r>
+            <a:r>
+              <a:rPr lang="en-US" sz="2000" i="0" dirty="0" err="1">
+                <a:solidFill>
+                  <a:srgbClr val="335B74"/>
+                </a:solidFill>
+              </a:rPr>
+              <a:t>weekactiviteiten</a:t>
+            </a:r>
+            <a:r>
+              <a:rPr lang="en-US" sz="2000" i="0" dirty="0">
+                <a:solidFill>
+                  <a:srgbClr val="335B74"/>
+                </a:solidFill>
+              </a:rPr>
+              <a:t>)* 20 (</a:t>
+            </a:r>
+            <a:r>
+              <a:rPr lang="en-US" sz="2000" i="0" dirty="0" err="1">
+                <a:solidFill>
+                  <a:srgbClr val="335B74"/>
+                </a:solidFill>
+              </a:rPr>
+              <a:t>bonuspunten</a:t>
+            </a:r>
+            <a:r>
+              <a:rPr lang="en-US" sz="2000" i="0" dirty="0" smtClean="0">
+                <a:solidFill>
+                  <a:srgbClr val="335B74"/>
+                </a:solidFill>
+              </a:rPr>
+              <a:t>)</a:t>
+            </a:r>
+            <a:endParaRPr lang="en-US" i="0" dirty="0" smtClean="0"/>
+          </a:p>
+          <a:p>
+            <a:r>
+              <a:rPr lang="en-US" dirty="0" err="1" smtClean="0"/>
+              <a:t>Ondergrens</a:t>
+            </a:r>
             <a:endParaRPr lang="en-US" dirty="0"/>
           </a:p>
           <a:p>
             <a:pPr lvl="1"/>
             <a:r>
-              <a:rPr lang="en-US" dirty="0" err="1"/>
-              <a:t>aangepast</a:t>
-            </a:r>
-            <a:endParaRPr lang="en-US" dirty="0"/>
-          </a:p>
-          <a:p>
-            <a:r>
-              <a:rPr lang="en-US" dirty="0" err="1"/>
-              <a:t>Ondergrens</a:t>
-            </a:r>
-            <a:endParaRPr lang="en-US" dirty="0"/>
-          </a:p>
-          <a:p>
-            <a:pPr lvl="1"/>
-            <a:r>
-              <a:rPr lang="en-US" dirty="0" err="1"/>
+              <a:rPr lang="en-US" i="0" dirty="0" err="1" smtClean="0"/>
               <a:t>Theoretisch</a:t>
             </a:r>
-            <a:endParaRPr lang="en-US" dirty="0"/>
+            <a:endParaRPr lang="en-US" i="0" dirty="0" smtClean="0"/>
+          </a:p>
+          <a:p>
+            <a:pPr marL="530352" lvl="1" indent="0">
+              <a:buNone/>
+            </a:pPr>
+            <a:r>
+              <a:rPr lang="en-US" i="0" dirty="0"/>
+              <a:t>	</a:t>
+            </a:r>
+            <a:r>
+              <a:rPr lang="en-US" i="0" dirty="0" smtClean="0"/>
+              <a:t>	-</a:t>
+            </a:r>
+            <a:r>
+              <a:rPr lang="nl-NL" sz="1900" b="1" i="0" dirty="0" smtClean="0">
+                <a:solidFill>
+                  <a:srgbClr val="335B74"/>
+                </a:solidFill>
+              </a:rPr>
+              <a:t>4946 </a:t>
+            </a:r>
+            <a:r>
+              <a:rPr lang="nl-NL" sz="1900" i="0" dirty="0">
+                <a:solidFill>
+                  <a:srgbClr val="335B74"/>
+                </a:solidFill>
+              </a:rPr>
+              <a:t>= 1000 (geldig rooster</a:t>
+            </a:r>
+            <a:r>
+              <a:rPr lang="nl-NL" sz="1900" i="0" dirty="0" smtClean="0">
+                <a:solidFill>
+                  <a:srgbClr val="335B74"/>
+                </a:solidFill>
+              </a:rPr>
+              <a:t>) – </a:t>
+            </a:r>
+            <a:r>
+              <a:rPr lang="nl-NL" sz="1900" i="0" dirty="0">
+                <a:solidFill>
+                  <a:srgbClr val="335B74"/>
+                </a:solidFill>
+              </a:rPr>
+              <a:t>1000 (</a:t>
+            </a:r>
+            <a:r>
+              <a:rPr lang="nl-NL" sz="1900" i="0" dirty="0" err="1" smtClean="0">
+                <a:solidFill>
+                  <a:srgbClr val="335B74"/>
+                </a:solidFill>
+              </a:rPr>
+              <a:t>vakspreiding</a:t>
+            </a:r>
+            <a:r>
+              <a:rPr lang="nl-NL" sz="1900" i="0" dirty="0" smtClean="0">
+                <a:solidFill>
+                  <a:srgbClr val="335B74"/>
+                </a:solidFill>
+              </a:rPr>
+              <a:t>) </a:t>
+            </a:r>
+            <a:br>
+              <a:rPr lang="nl-NL" sz="1900" i="0" dirty="0" smtClean="0">
+                <a:solidFill>
+                  <a:srgbClr val="335B74"/>
+                </a:solidFill>
+              </a:rPr>
+            </a:br>
+            <a:r>
+              <a:rPr lang="nl-NL" sz="1900" i="0" dirty="0" smtClean="0">
+                <a:solidFill>
+                  <a:srgbClr val="335B74"/>
+                </a:solidFill>
+              </a:rPr>
+              <a:t>			– </a:t>
+            </a:r>
+            <a:r>
+              <a:rPr lang="nl-NL" sz="1900" i="0" dirty="0">
+                <a:solidFill>
+                  <a:srgbClr val="335B74"/>
+                </a:solidFill>
+              </a:rPr>
+              <a:t>(6 – 1) * 609 </a:t>
+            </a:r>
+            <a:r>
+              <a:rPr lang="nl-NL" sz="1900" i="0" dirty="0" smtClean="0">
+                <a:solidFill>
+                  <a:srgbClr val="335B74"/>
+                </a:solidFill>
+              </a:rPr>
+              <a:t>(roosterconflicten) – </a:t>
+            </a:r>
+            <a:r>
+              <a:rPr lang="nl-NL" sz="1900" i="0" dirty="0">
+                <a:solidFill>
+                  <a:srgbClr val="335B74"/>
+                </a:solidFill>
+              </a:rPr>
+              <a:t>1901 (</a:t>
+            </a:r>
+            <a:r>
+              <a:rPr lang="nl-NL" sz="1900" i="0" dirty="0" smtClean="0">
+                <a:solidFill>
+                  <a:srgbClr val="335B74"/>
+                </a:solidFill>
+              </a:rPr>
+              <a:t>zaalconflict)</a:t>
+            </a:r>
+            <a:endParaRPr lang="nl-NL" sz="1900" i="0" dirty="0">
+              <a:solidFill>
+                <a:srgbClr val="335B74"/>
+              </a:solidFill>
+            </a:endParaRPr>
+          </a:p>
+          <a:p>
+            <a:pPr marL="530352" lvl="1" indent="0">
+              <a:buNone/>
+            </a:pPr>
+            <a:endParaRPr lang="en-US" i="0" dirty="0" smtClean="0"/>
           </a:p>
           <a:p>
             <a:endParaRPr lang="en-US" dirty="0"/>
@@ -4416,6 +5004,13 @@
   <p:clrMapOvr>
     <a:masterClrMapping/>
   </p:clrMapOvr>
+  <p:timing>
+    <p:tnLst>
+      <p:par>
+        <p:cTn id="1" dur="indefinite" restart="never" nodeType="tmRoot"/>
+      </p:par>
+    </p:tnLst>
+  </p:timing>
 </p:sld>
 </file>
 
@@ -4438,7 +5033,7 @@
       </p:grpSpPr>
       <p:sp>
         <p:nvSpPr>
-          <p:cNvPr id="2" name="Title 1"/>
+          <p:cNvPr id="2" name="Titel 1"/>
           <p:cNvSpPr>
             <a:spLocks noGrp="1"/>
           </p:cNvSpPr>
@@ -4452,161 +5047,176 @@
           <a:lstStyle/>
           <a:p>
             <a:r>
-              <a:rPr lang="en-US" dirty="0" err="1"/>
-              <a:t>Methoden</a:t>
-            </a:r>
-            <a:endParaRPr lang="en-US" dirty="0"/>
-          </a:p>
-        </p:txBody>
-      </p:sp>
-      <p:sp>
-        <p:nvSpPr>
-          <p:cNvPr id="3" name="Content Placeholder 2"/>
-          <p:cNvSpPr>
-            <a:spLocks noGrp="1"/>
-          </p:cNvSpPr>
-          <p:nvPr>
-            <p:ph idx="1"/>
-          </p:nvPr>
-        </p:nvSpPr>
-        <p:spPr/>
-        <p:txBody>
-          <a:bodyPr/>
-          <a:lstStyle/>
-          <a:p>
-            <a:r>
-              <a:rPr lang="en-US" dirty="0" err="1"/>
-              <a:t>Uitleg</a:t>
-            </a:r>
-            <a:r>
-              <a:rPr lang="en-US" dirty="0"/>
-              <a:t> </a:t>
-            </a:r>
-            <a:r>
-              <a:rPr lang="en-US" dirty="0" err="1"/>
-              <a:t>algoritmes</a:t>
-            </a:r>
-            <a:endParaRPr lang="en-US" dirty="0"/>
-          </a:p>
-          <a:p>
-            <a:pPr lvl="1"/>
-            <a:r>
-              <a:rPr lang="en-US" dirty="0" err="1"/>
-              <a:t>Hillclimber</a:t>
-            </a:r>
-            <a:r>
-              <a:rPr lang="en-US" dirty="0"/>
-              <a:t>/simulated annealing</a:t>
-            </a:r>
-          </a:p>
-          <a:p>
-            <a:pPr lvl="1"/>
-            <a:r>
-              <a:rPr lang="en-US" dirty="0"/>
-              <a:t>Genetic </a:t>
-            </a:r>
-            <a:r>
-              <a:rPr lang="en-US" dirty="0" err="1"/>
-              <a:t>algoritme</a:t>
-            </a:r>
-            <a:endParaRPr lang="en-US" dirty="0"/>
-          </a:p>
-          <a:p>
-            <a:pPr lvl="1"/>
-            <a:r>
-              <a:rPr lang="en-US" dirty="0" err="1"/>
-              <a:t>Hybride</a:t>
-            </a:r>
-            <a:r>
-              <a:rPr lang="en-US" dirty="0"/>
-              <a:t> (sequential en </a:t>
-            </a:r>
-            <a:r>
-              <a:rPr lang="en-US" dirty="0" err="1"/>
-              <a:t>dan</a:t>
-            </a:r>
-            <a:r>
-              <a:rPr lang="en-US" dirty="0"/>
-              <a:t> mix </a:t>
-            </a:r>
-            <a:r>
-              <a:rPr lang="en-US" dirty="0" err="1"/>
-              <a:t>bovenstaande</a:t>
-            </a:r>
-            <a:r>
-              <a:rPr lang="en-US" dirty="0"/>
-              <a:t> twee </a:t>
-            </a:r>
-            <a:r>
-              <a:rPr lang="en-US" dirty="0" err="1"/>
-              <a:t>algoritmes</a:t>
-            </a:r>
-            <a:r>
-              <a:rPr lang="en-US" dirty="0"/>
-              <a:t>)</a:t>
-            </a:r>
-          </a:p>
-          <a:p>
-            <a:r>
-              <a:rPr lang="en-US" dirty="0" err="1"/>
-              <a:t>Uitleg</a:t>
-            </a:r>
-            <a:r>
-              <a:rPr lang="en-US" dirty="0"/>
-              <a:t> of </a:t>
-            </a:r>
-            <a:r>
-              <a:rPr lang="en-US" dirty="0" err="1"/>
-              <a:t>algoritmes</a:t>
-            </a:r>
-            <a:r>
-              <a:rPr lang="en-US" dirty="0"/>
-              <a:t> exact </a:t>
-            </a:r>
-            <a:r>
-              <a:rPr lang="en-US" dirty="0" err="1"/>
-              <a:t>zijn</a:t>
-            </a:r>
-            <a:r>
-              <a:rPr lang="en-US" dirty="0"/>
-              <a:t> of </a:t>
-            </a:r>
-            <a:r>
-              <a:rPr lang="en-US" dirty="0" err="1"/>
-              <a:t>een</a:t>
-            </a:r>
-            <a:r>
-              <a:rPr lang="en-US" dirty="0"/>
-              <a:t> </a:t>
-            </a:r>
-            <a:r>
-              <a:rPr lang="en-US" dirty="0" err="1"/>
-              <a:t>heuristiek</a:t>
-            </a:r>
-            <a:endParaRPr lang="en-US" dirty="0"/>
-          </a:p>
-          <a:p>
-            <a:endParaRPr lang="en-US" dirty="0"/>
-          </a:p>
-          <a:p>
-            <a:endParaRPr lang="en-US" dirty="0"/>
-          </a:p>
-          <a:p>
-            <a:pPr lvl="1"/>
-            <a:endParaRPr lang="en-US" dirty="0"/>
-          </a:p>
-        </p:txBody>
-      </p:sp>
+              <a:rPr lang="nl-NL" dirty="0" smtClean="0"/>
+              <a:t>Toestandsruimte</a:t>
+            </a:r>
+            <a:endParaRPr lang="nl-NL" dirty="0"/>
+          </a:p>
+        </p:txBody>
+      </p:sp>
+      <mc:AlternateContent xmlns:mc="http://schemas.openxmlformats.org/markup-compatibility/2006">
+        <mc:Choice xmlns:a14="http://schemas.microsoft.com/office/drawing/2010/main" Requires="a14">
+          <p:sp>
+            <p:nvSpPr>
+              <p:cNvPr id="3" name="Tijdelijke aanduiding voor inhoud 2"/>
+              <p:cNvSpPr>
+                <a:spLocks noGrp="1"/>
+              </p:cNvSpPr>
+              <p:nvPr>
+                <p:ph idx="1"/>
+              </p:nvPr>
+            </p:nvSpPr>
+            <p:spPr/>
+            <p:txBody>
+              <a:bodyPr/>
+              <a:lstStyle/>
+              <a:p>
+                <a:r>
+                  <a:rPr lang="nl-NL" dirty="0" smtClean="0">
+                    <a:latin typeface="Cambria Math" panose="02040503050406030204" pitchFamily="18" charset="0"/>
+                  </a:rPr>
+                  <a:t>145 zaalsloten</a:t>
+                </a:r>
+              </a:p>
+              <a:p>
+                <a:r>
+                  <a:rPr lang="nl-NL" dirty="0" smtClean="0">
+                    <a:latin typeface="Cambria Math" panose="02040503050406030204" pitchFamily="18" charset="0"/>
+                  </a:rPr>
+                  <a:t>129 activiteiten</a:t>
+                </a:r>
+              </a:p>
+              <a:p>
+                <a:r>
+                  <a:rPr lang="nl-NL" dirty="0" smtClean="0">
+                    <a:latin typeface="Cambria Math" panose="02040503050406030204" pitchFamily="18" charset="0"/>
+                  </a:rPr>
+                  <a:t>145-129 lege plekken in het rooster</a:t>
+                </a:r>
+              </a:p>
+              <a:p>
+                <a:endParaRPr lang="nl-NL" i="1" dirty="0">
+                  <a:latin typeface="Cambria Math" panose="02040503050406030204" pitchFamily="18" charset="0"/>
+                </a:endParaRPr>
+              </a:p>
+              <a:p>
+                <a14:m>
+                  <m:oMath xmlns:m="http://schemas.openxmlformats.org/officeDocument/2006/math">
+                    <m:f>
+                      <m:fPr>
+                        <m:ctrlPr>
+                          <a:rPr lang="nl-NL" sz="2800" i="1" smtClean="0">
+                            <a:latin typeface="Cambria Math" panose="02040503050406030204" pitchFamily="18" charset="0"/>
+                          </a:rPr>
+                        </m:ctrlPr>
+                      </m:fPr>
+                      <m:num>
+                        <m:r>
+                          <a:rPr lang="nl-NL" sz="2800" i="1">
+                            <a:latin typeface="Cambria Math" panose="02040503050406030204" pitchFamily="18" charset="0"/>
+                          </a:rPr>
+                          <m:t>145!</m:t>
+                        </m:r>
+                      </m:num>
+                      <m:den>
+                        <m:r>
+                          <a:rPr lang="nl-NL" sz="2800" b="0" i="1" smtClean="0">
+                            <a:latin typeface="Cambria Math" panose="02040503050406030204" pitchFamily="18" charset="0"/>
+                          </a:rPr>
+                          <m:t>(145−</m:t>
+                        </m:r>
+                        <m:r>
+                          <a:rPr lang="nl-NL" sz="2800" i="1">
+                            <a:latin typeface="Cambria Math" panose="02040503050406030204" pitchFamily="18" charset="0"/>
+                          </a:rPr>
+                          <m:t>129</m:t>
+                        </m:r>
+                        <m:r>
+                          <a:rPr lang="nl-NL" sz="2800" b="0" i="1" smtClean="0">
+                            <a:latin typeface="Cambria Math" panose="02040503050406030204" pitchFamily="18" charset="0"/>
+                          </a:rPr>
+                          <m:t>)</m:t>
+                        </m:r>
+                        <m:r>
+                          <a:rPr lang="nl-NL" sz="2800" i="1">
+                            <a:latin typeface="Cambria Math" panose="02040503050406030204" pitchFamily="18" charset="0"/>
+                          </a:rPr>
+                          <m:t>!</m:t>
+                        </m:r>
+                      </m:den>
+                    </m:f>
+                    <m:r>
+                      <a:rPr lang="nl-NL" sz="2800" i="1">
+                        <a:latin typeface="Cambria Math" panose="02040503050406030204" pitchFamily="18" charset="0"/>
+                      </a:rPr>
+                      <m:t> </m:t>
+                    </m:r>
+                  </m:oMath>
+                </a14:m>
+                <a:r>
+                  <a:rPr lang="nl-NL" dirty="0"/>
+                  <a:t> = 3.8464880164×10</a:t>
+                </a:r>
+                <a:r>
+                  <a:rPr lang="nl-NL" baseline="30000" dirty="0"/>
+                  <a:t>238</a:t>
+                </a:r>
+                <a:endParaRPr lang="nl-NL" dirty="0"/>
+              </a:p>
+            </p:txBody>
+          </p:sp>
+        </mc:Choice>
+        <mc:Fallback>
+          <p:sp>
+            <p:nvSpPr>
+              <p:cNvPr id="3" name="Tijdelijke aanduiding voor inhoud 2"/>
+              <p:cNvSpPr>
+                <a:spLocks noGrp="1" noRot="1" noChangeAspect="1" noMove="1" noResize="1" noEditPoints="1" noAdjustHandles="1" noChangeArrowheads="1" noChangeShapeType="1" noTextEdit="1"/>
+              </p:cNvSpPr>
+              <p:nvPr>
+                <p:ph idx="1"/>
+              </p:nvPr>
+            </p:nvSpPr>
+            <p:spPr>
+              <a:blipFill rotWithShape="0">
+                <a:blip r:embed="rId2"/>
+                <a:stretch>
+                  <a:fillRect l="-825" t="-1840"/>
+                </a:stretch>
+              </a:blipFill>
+            </p:spPr>
+            <p:txBody>
+              <a:bodyPr/>
+              <a:lstStyle/>
+              <a:p>
+                <a:r>
+                  <a:rPr lang="nl-NL">
+                    <a:noFill/>
+                  </a:rPr>
+                  <a:t> </a:t>
+                </a:r>
+              </a:p>
+            </p:txBody>
+          </p:sp>
+        </mc:Fallback>
+      </mc:AlternateContent>
     </p:spTree>
     <p:extLst>
       <p:ext uri="{BB962C8B-B14F-4D97-AF65-F5344CB8AC3E}">
-        <p14:creationId xmlns:p14="http://schemas.microsoft.com/office/powerpoint/2010/main" val="2798988976"/>
+        <p14:creationId xmlns:p14="http://schemas.microsoft.com/office/powerpoint/2010/main" val="773560942"/>
       </p:ext>
     </p:extLst>
   </p:cSld>
   <p:clrMapOvr>
     <a:masterClrMapping/>
   </p:clrMapOvr>
+  <p:timing>
+    <p:tnLst>
+      <p:par>
+        <p:cTn id="1" dur="indefinite" restart="never" nodeType="tmRoot"/>
+      </p:par>
+    </p:tnLst>
+  </p:timing>
 </p:sld>
 </file>
 
@@ -4639,39 +5249,50 @@
         </p:nvSpPr>
         <p:spPr/>
         <p:txBody>
-          <a:bodyPr>
-            <a:normAutofit fontScale="90000"/>
-          </a:bodyPr>
-          <a:lstStyle/>
-          <a:p>
-            <a:r>
-              <a:rPr lang="en-US" dirty="0" err="1"/>
-              <a:t>Experimenteren</a:t>
-            </a:r>
-            <a:br>
-              <a:rPr lang="en-US" dirty="0"/>
-            </a:br>
-            <a:endParaRPr lang="en-US" dirty="0"/>
-          </a:p>
-        </p:txBody>
-      </p:sp>
-      <p:sp>
-        <p:nvSpPr>
-          <p:cNvPr id="3" name="Content Placeholder 2"/>
-          <p:cNvSpPr>
-            <a:spLocks noGrp="1"/>
-          </p:cNvSpPr>
-          <p:nvPr>
-            <p:ph idx="1"/>
-          </p:nvPr>
-        </p:nvSpPr>
-        <p:spPr/>
-        <p:txBody>
           <a:bodyPr/>
           <a:lstStyle/>
           <a:p>
             <a:r>
               <a:rPr lang="en-US" dirty="0" err="1"/>
+              <a:t>Methoden</a:t>
+            </a:r>
+            <a:endParaRPr lang="en-US" dirty="0"/>
+          </a:p>
+        </p:txBody>
+      </p:sp>
+      <p:sp>
+        <p:nvSpPr>
+          <p:cNvPr id="3" name="Content Placeholder 2"/>
+          <p:cNvSpPr>
+            <a:spLocks noGrp="1"/>
+          </p:cNvSpPr>
+          <p:nvPr>
+            <p:ph idx="1"/>
+          </p:nvPr>
+        </p:nvSpPr>
+        <p:spPr/>
+        <p:txBody>
+          <a:bodyPr/>
+          <a:lstStyle/>
+          <a:p>
+            <a:r>
+              <a:rPr lang="en-US" dirty="0" err="1"/>
+              <a:t>Uitleg</a:t>
+            </a:r>
+            <a:r>
+              <a:rPr lang="en-US" dirty="0"/>
+              <a:t> </a:t>
+            </a:r>
+            <a:r>
+              <a:rPr lang="en-US" dirty="0" err="1"/>
+              <a:t>algoritmes</a:t>
+            </a:r>
+            <a:endParaRPr lang="en-US" dirty="0"/>
+          </a:p>
+          <a:p>
+            <a:pPr lvl="1"/>
+            <a:r>
+              <a:rPr lang="en-US" dirty="0" err="1"/>
               <a:t>Hillclimber</a:t>
             </a:r>
             <a:r>
@@ -4683,11 +5304,77 @@
             <a:pPr lvl="1"/>
             <a:r>
               <a:rPr lang="en-US" dirty="0"/>
-              <a:t>Simulated annealing </a:t>
-            </a:r>
-            <a:r>
-              <a:rPr lang="en-US" dirty="0" err="1"/>
-              <a:t>eerst</a:t>
+              <a:t>Genetic </a:t>
+            </a:r>
+            <a:r>
+              <a:rPr lang="en-US" dirty="0" err="1"/>
+              <a:t>algoritme</a:t>
+            </a:r>
+            <a:endParaRPr lang="en-US" dirty="0"/>
+          </a:p>
+          <a:p>
+            <a:pPr lvl="1"/>
+            <a:r>
+              <a:rPr lang="en-US" dirty="0" err="1"/>
+              <a:t>Hybride</a:t>
+            </a:r>
+            <a:r>
+              <a:rPr lang="en-US" dirty="0"/>
+              <a:t> (sequential en </a:t>
+            </a:r>
+            <a:r>
+              <a:rPr lang="en-US" dirty="0" err="1"/>
+              <a:t>dan</a:t>
+            </a:r>
+            <a:r>
+              <a:rPr lang="en-US" dirty="0"/>
+              <a:t> mix </a:t>
+            </a:r>
+            <a:r>
+              <a:rPr lang="en-US" dirty="0" err="1"/>
+              <a:t>bovenstaande</a:t>
+            </a:r>
+            <a:r>
+              <a:rPr lang="en-US" dirty="0"/>
+              <a:t> twee </a:t>
+            </a:r>
+            <a:r>
+              <a:rPr lang="en-US" dirty="0" err="1"/>
+              <a:t>algoritmes</a:t>
+            </a:r>
+            <a:r>
+              <a:rPr lang="en-US" dirty="0"/>
+              <a:t>)</a:t>
+            </a:r>
+          </a:p>
+          <a:p>
+            <a:r>
+              <a:rPr lang="en-US" dirty="0" err="1"/>
+              <a:t>Uitleg</a:t>
+            </a:r>
+            <a:r>
+              <a:rPr lang="en-US" dirty="0"/>
+              <a:t> of </a:t>
+            </a:r>
+            <a:r>
+              <a:rPr lang="en-US" dirty="0" err="1"/>
+              <a:t>algoritmes</a:t>
+            </a:r>
+            <a:r>
+              <a:rPr lang="en-US" dirty="0"/>
+              <a:t> exact </a:t>
+            </a:r>
+            <a:r>
+              <a:rPr lang="en-US" dirty="0" err="1"/>
+              <a:t>zijn</a:t>
+            </a:r>
+            <a:r>
+              <a:rPr lang="en-US" dirty="0"/>
+              <a:t> of </a:t>
+            </a:r>
+            <a:r>
+              <a:rPr lang="en-US" dirty="0" err="1"/>
+              <a:t>een</a:t>
             </a:r>
             <a:r>
               <a:rPr lang="en-US" dirty="0"/>
@@ -4695,232 +5382,14 @@
             </a:r>
             <a:r>
               <a:rPr lang="en-US" dirty="0" err="1"/>
-              <a:t>kijken</a:t>
-            </a:r>
-            <a:r>
-              <a:rPr lang="en-US" dirty="0"/>
-              <a:t> </a:t>
-            </a:r>
-            <a:r>
-              <a:rPr lang="en-US" dirty="0" err="1"/>
-              <a:t>welke</a:t>
-            </a:r>
-            <a:r>
-              <a:rPr lang="en-US" dirty="0"/>
-              <a:t> cooling schema het </a:t>
-            </a:r>
-            <a:r>
-              <a:rPr lang="en-US" dirty="0" err="1"/>
-              <a:t>beste</a:t>
-            </a:r>
-            <a:r>
-              <a:rPr lang="en-US" dirty="0"/>
-              <a:t> is</a:t>
-            </a:r>
-          </a:p>
-          <a:p>
-            <a:pPr lvl="1"/>
-            <a:r>
-              <a:rPr lang="en-US" dirty="0"/>
-              <a:t>Score </a:t>
-            </a:r>
-            <a:r>
-              <a:rPr lang="en-US" dirty="0" err="1"/>
-              <a:t>algoritmes</a:t>
-            </a:r>
-            <a:r>
-              <a:rPr lang="en-US" dirty="0"/>
-              <a:t> </a:t>
-            </a:r>
-            <a:r>
-              <a:rPr lang="en-US" dirty="0" err="1"/>
-              <a:t>vs</a:t>
-            </a:r>
-            <a:r>
-              <a:rPr lang="en-US" dirty="0"/>
-              <a:t> </a:t>
-            </a:r>
-            <a:r>
-              <a:rPr lang="en-US" dirty="0" err="1"/>
-              <a:t>aantal</a:t>
-            </a:r>
-            <a:r>
-              <a:rPr lang="en-US" dirty="0"/>
-              <a:t> </a:t>
-            </a:r>
-            <a:r>
-              <a:rPr lang="en-US" dirty="0" err="1"/>
-              <a:t>interaties</a:t>
+              <a:t>heuristiek</a:t>
             </a:r>
             <a:endParaRPr lang="en-US" dirty="0"/>
           </a:p>
           <a:p>
-            <a:pPr lvl="1"/>
-            <a:r>
-              <a:rPr lang="en-US" dirty="0" err="1"/>
-              <a:t>Normaal</a:t>
-            </a:r>
-            <a:r>
-              <a:rPr lang="en-US" dirty="0"/>
-              <a:t> </a:t>
-            </a:r>
-            <a:r>
-              <a:rPr lang="en-US" dirty="0" err="1"/>
-              <a:t>verdeling</a:t>
-            </a:r>
-            <a:r>
-              <a:rPr lang="en-US" dirty="0"/>
-              <a:t> </a:t>
-            </a:r>
-            <a:r>
-              <a:rPr lang="en-US" dirty="0" err="1"/>
-              <a:t>drie</a:t>
-            </a:r>
-            <a:r>
-              <a:rPr lang="en-US" dirty="0"/>
-              <a:t> </a:t>
-            </a:r>
-            <a:r>
-              <a:rPr lang="en-US" dirty="0" err="1"/>
-              <a:t>algoritmes</a:t>
-            </a:r>
             <a:endParaRPr lang="en-US" dirty="0"/>
           </a:p>
           <a:p>
-            <a:r>
-              <a:rPr lang="en-US" dirty="0"/>
-              <a:t>Genetic</a:t>
-            </a:r>
-          </a:p>
-          <a:p>
-            <a:pPr lvl="1"/>
-            <a:r>
-              <a:rPr lang="en-US" dirty="0" err="1"/>
-              <a:t>Keuze</a:t>
-            </a:r>
-            <a:r>
-              <a:rPr lang="en-US" dirty="0"/>
-              <a:t> </a:t>
-            </a:r>
-            <a:r>
-              <a:rPr lang="en-US" dirty="0" err="1"/>
-              <a:t>tussen</a:t>
-            </a:r>
-            <a:r>
-              <a:rPr lang="en-US" dirty="0"/>
-              <a:t> hoe de </a:t>
-            </a:r>
-            <a:r>
-              <a:rPr lang="en-US" dirty="0" err="1"/>
-              <a:t>overgebleven</a:t>
-            </a:r>
-            <a:r>
-              <a:rPr lang="en-US" dirty="0"/>
-              <a:t> </a:t>
-            </a:r>
-            <a:r>
-              <a:rPr lang="en-US" dirty="0" err="1"/>
-              <a:t>vakken</a:t>
-            </a:r>
-            <a:r>
-              <a:rPr lang="en-US" dirty="0"/>
-              <a:t> </a:t>
-            </a:r>
-            <a:r>
-              <a:rPr lang="en-US" dirty="0" err="1"/>
-              <a:t>nog</a:t>
-            </a:r>
-            <a:r>
-              <a:rPr lang="en-US" dirty="0"/>
-              <a:t> in </a:t>
-            </a:r>
-            <a:r>
-              <a:rPr lang="en-US" dirty="0" err="1"/>
-              <a:t>te</a:t>
-            </a:r>
-            <a:r>
-              <a:rPr lang="en-US" dirty="0"/>
-              <a:t> </a:t>
-            </a:r>
-            <a:r>
-              <a:rPr lang="en-US" dirty="0" err="1"/>
-              <a:t>roosteren</a:t>
-            </a:r>
-            <a:r>
-              <a:rPr lang="en-US" dirty="0"/>
-              <a:t>(</a:t>
-            </a:r>
-            <a:r>
-              <a:rPr lang="en-US" dirty="0" err="1"/>
-              <a:t>zaalgrootte</a:t>
-            </a:r>
-            <a:r>
-              <a:rPr lang="en-US" dirty="0"/>
-              <a:t>, </a:t>
-            </a:r>
-            <a:r>
-              <a:rPr lang="en-US" dirty="0" err="1"/>
-              <a:t>dichtsbijzijnde</a:t>
-            </a:r>
-            <a:r>
-              <a:rPr lang="en-US" dirty="0"/>
-              <a:t> </a:t>
-            </a:r>
-            <a:r>
-              <a:rPr lang="en-US" dirty="0" err="1"/>
-              <a:t>zaalslot</a:t>
-            </a:r>
-            <a:r>
-              <a:rPr lang="en-US" dirty="0"/>
-              <a:t>?)</a:t>
-            </a:r>
-          </a:p>
-          <a:p>
-            <a:pPr lvl="1"/>
-            <a:r>
-              <a:rPr lang="en-US" dirty="0" err="1"/>
-              <a:t>Mutatiekans</a:t>
-            </a:r>
-            <a:r>
-              <a:rPr lang="en-US" dirty="0"/>
-              <a:t> </a:t>
-            </a:r>
-            <a:r>
-              <a:rPr lang="en-US" dirty="0" err="1"/>
-              <a:t>aanpassen</a:t>
-            </a:r>
-            <a:endParaRPr lang="en-US" dirty="0"/>
-          </a:p>
-          <a:p>
-            <a:pPr lvl="1"/>
-            <a:r>
-              <a:rPr lang="en-US" dirty="0" err="1"/>
-              <a:t>Populatiegrootte</a:t>
-            </a:r>
-            <a:r>
-              <a:rPr lang="en-US" dirty="0"/>
-              <a:t> en </a:t>
-            </a:r>
-            <a:r>
-              <a:rPr lang="en-US" dirty="0" err="1"/>
-              <a:t>aantal</a:t>
-            </a:r>
-            <a:r>
-              <a:rPr lang="en-US" dirty="0"/>
-              <a:t> </a:t>
-            </a:r>
-            <a:r>
-              <a:rPr lang="en-US" dirty="0" err="1"/>
-              <a:t>generaties</a:t>
-            </a:r>
-            <a:endParaRPr lang="en-US" dirty="0"/>
-          </a:p>
-          <a:p>
-            <a:pPr lvl="1"/>
-            <a:endParaRPr lang="en-US" dirty="0"/>
-          </a:p>
-          <a:p>
-            <a:pPr lvl="1"/>
             <a:endParaRPr lang="en-US" dirty="0"/>
           </a:p>
           <a:p>
@@ -4932,13 +5401,20 @@
     </p:spTree>
     <p:extLst>
       <p:ext uri="{BB962C8B-B14F-4D97-AF65-F5344CB8AC3E}">
-        <p14:creationId xmlns:p14="http://schemas.microsoft.com/office/powerpoint/2010/main" val="161738935"/>
+        <p14:creationId xmlns:p14="http://schemas.microsoft.com/office/powerpoint/2010/main" val="2798988976"/>
       </p:ext>
     </p:extLst>
   </p:cSld>
   <p:clrMapOvr>
     <a:masterClrMapping/>
   </p:clrMapOvr>
+  <p:timing>
+    <p:tnLst>
+      <p:par>
+        <p:cTn id="1" dur="indefinite" restart="never" nodeType="tmRoot"/>
+      </p:par>
+    </p:tnLst>
+  </p:timing>
 </p:sld>
 </file>
 
@@ -4972,14 +5448,21 @@
         <p:spPr/>
         <p:txBody>
           <a:bodyPr>
-            <a:normAutofit/>
+            <a:normAutofit fontScale="90000"/>
           </a:bodyPr>
           <a:lstStyle/>
           <a:p>
             <a:r>
               <a:rPr lang="en-US" dirty="0" err="1"/>
-              <a:t>Eperimenteren</a:t>
-            </a:r>
+              <a:t>Experimenteren</a:t>
+            </a:r>
+            <a:r>
+              <a:rPr lang="en-US" dirty="0"/>
+              <a:t/>
+            </a:r>
+            <a:br>
+              <a:rPr lang="en-US" dirty="0"/>
+            </a:br>
             <a:endParaRPr lang="en-US" dirty="0"/>
           </a:p>
         </p:txBody>
@@ -5001,7 +5484,85 @@
           <a:p>
             <a:r>
               <a:rPr lang="en-US" dirty="0" err="1"/>
-              <a:t>Hybride</a:t>
+              <a:t>Hillclimber</a:t>
+            </a:r>
+            <a:r>
+              <a:rPr lang="en-US" dirty="0"/>
+              <a:t>/simulated annealing</a:t>
+            </a:r>
+          </a:p>
+          <a:p>
+            <a:pPr lvl="1"/>
+            <a:r>
+              <a:rPr lang="en-US" dirty="0"/>
+              <a:t>Simulated annealing </a:t>
+            </a:r>
+            <a:r>
+              <a:rPr lang="en-US" dirty="0" err="1"/>
+              <a:t>eerst</a:t>
+            </a:r>
+            <a:r>
+              <a:rPr lang="en-US" dirty="0"/>
+              <a:t> </a:t>
+            </a:r>
+            <a:r>
+              <a:rPr lang="en-US" dirty="0" err="1"/>
+              <a:t>kijken</a:t>
+            </a:r>
+            <a:r>
+              <a:rPr lang="en-US" dirty="0"/>
+              <a:t> </a:t>
+            </a:r>
+            <a:r>
+              <a:rPr lang="en-US" dirty="0" err="1"/>
+              <a:t>welke</a:t>
+            </a:r>
+            <a:r>
+              <a:rPr lang="en-US" dirty="0"/>
+              <a:t> cooling schema het </a:t>
+            </a:r>
+            <a:r>
+              <a:rPr lang="en-US" dirty="0" err="1"/>
+              <a:t>beste</a:t>
+            </a:r>
+            <a:r>
+              <a:rPr lang="en-US" dirty="0"/>
+              <a:t> is</a:t>
+            </a:r>
+          </a:p>
+          <a:p>
+            <a:pPr lvl="1"/>
+            <a:r>
+              <a:rPr lang="en-US" dirty="0"/>
+              <a:t>Score </a:t>
+            </a:r>
+            <a:r>
+              <a:rPr lang="en-US" dirty="0" err="1"/>
+              <a:t>algoritmes</a:t>
+            </a:r>
+            <a:r>
+              <a:rPr lang="en-US" dirty="0"/>
+              <a:t> </a:t>
+            </a:r>
+            <a:r>
+              <a:rPr lang="en-US" dirty="0" err="1"/>
+              <a:t>vs</a:t>
+            </a:r>
+            <a:r>
+              <a:rPr lang="en-US" dirty="0"/>
+              <a:t> </a:t>
+            </a:r>
+            <a:r>
+              <a:rPr lang="en-US" dirty="0" err="1"/>
+              <a:t>aantal</a:t>
+            </a:r>
+            <a:r>
+              <a:rPr lang="en-US" dirty="0"/>
+              <a:t> </a:t>
+            </a:r>
+            <a:r>
+              <a:rPr lang="en-US" dirty="0" err="1"/>
+              <a:t>interaties</a:t>
             </a:r>
             <a:endParaRPr lang="en-US" dirty="0"/>
           </a:p>
@@ -5009,49 +5570,194 @@
             <a:pPr lvl="1"/>
             <a:r>
               <a:rPr lang="en-US" dirty="0" err="1"/>
-              <a:t>Eerst</a:t>
-            </a:r>
-            <a:r>
-              <a:rPr lang="en-US" dirty="0"/>
-              <a:t> sequential op </a:t>
+              <a:t>Normaal</a:t>
+            </a:r>
+            <a:r>
+              <a:rPr lang="en-US" dirty="0"/>
+              <a:t> </a:t>
+            </a:r>
+            <a:r>
+              <a:rPr lang="en-US" dirty="0" err="1"/>
+              <a:t>verdeling</a:t>
+            </a:r>
+            <a:r>
+              <a:rPr lang="en-US" dirty="0"/>
+              <a:t> </a:t>
+            </a:r>
+            <a:r>
+              <a:rPr lang="en-US" dirty="0" err="1"/>
+              <a:t>drie</a:t>
+            </a:r>
+            <a:r>
+              <a:rPr lang="en-US" dirty="0"/>
+              <a:t> </a:t>
+            </a:r>
+            <a:r>
+              <a:rPr lang="en-US" dirty="0" err="1"/>
+              <a:t>algoritmes</a:t>
+            </a:r>
+            <a:endParaRPr lang="en-US" dirty="0"/>
+          </a:p>
+          <a:p>
+            <a:r>
+              <a:rPr lang="en-US" dirty="0"/>
+              <a:t>Genetic</a:t>
+            </a:r>
+          </a:p>
+          <a:p>
+            <a:pPr lvl="1"/>
+            <a:r>
+              <a:rPr lang="en-US" dirty="0" err="1"/>
+              <a:t>Keuze</a:t>
+            </a:r>
+            <a:r>
+              <a:rPr lang="en-US" dirty="0"/>
+              <a:t> </a:t>
+            </a:r>
+            <a:r>
+              <a:rPr lang="en-US" dirty="0" err="1"/>
+              <a:t>tussen</a:t>
+            </a:r>
+            <a:r>
+              <a:rPr lang="en-US" dirty="0"/>
+              <a:t> hoe de </a:t>
+            </a:r>
+            <a:r>
+              <a:rPr lang="en-US" dirty="0" err="1"/>
+              <a:t>overgebleven</a:t>
+            </a:r>
+            <a:r>
+              <a:rPr lang="en-US" dirty="0"/>
+              <a:t> </a:t>
+            </a:r>
+            <a:r>
+              <a:rPr lang="en-US" dirty="0" err="1"/>
+              <a:t>vakken</a:t>
+            </a:r>
+            <a:r>
+              <a:rPr lang="en-US" dirty="0"/>
+              <a:t> </a:t>
+            </a:r>
+            <a:r>
+              <a:rPr lang="en-US" dirty="0" err="1"/>
+              <a:t>nog</a:t>
+            </a:r>
+            <a:r>
+              <a:rPr lang="en-US" dirty="0"/>
+              <a:t> in </a:t>
+            </a:r>
+            <a:r>
+              <a:rPr lang="en-US" dirty="0" err="1"/>
+              <a:t>te</a:t>
+            </a:r>
+            <a:r>
+              <a:rPr lang="en-US" dirty="0"/>
+              <a:t> </a:t>
+            </a:r>
+            <a:r>
+              <a:rPr lang="en-US" dirty="0" err="1"/>
+              <a:t>roosteren</a:t>
+            </a:r>
+            <a:r>
+              <a:rPr lang="en-US" dirty="0"/>
+              <a:t>(</a:t>
             </a:r>
             <a:r>
               <a:rPr lang="en-US" dirty="0" err="1"/>
               <a:t>zaalgrootte</a:t>
             </a:r>
+            <a:r>
+              <a:rPr lang="en-US" dirty="0"/>
+              <a:t>, </a:t>
+            </a:r>
+            <a:r>
+              <a:rPr lang="en-US" dirty="0" err="1"/>
+              <a:t>dichtsbijzijnde</a:t>
+            </a:r>
+            <a:r>
+              <a:rPr lang="en-US" dirty="0"/>
+              <a:t> </a:t>
+            </a:r>
+            <a:r>
+              <a:rPr lang="en-US" dirty="0" err="1"/>
+              <a:t>zaalslot</a:t>
+            </a:r>
+            <a:r>
+              <a:rPr lang="en-US" dirty="0"/>
+              <a:t>?)</a:t>
+            </a:r>
+          </a:p>
+          <a:p>
+            <a:pPr lvl="1"/>
+            <a:r>
+              <a:rPr lang="en-US" dirty="0" err="1"/>
+              <a:t>Mutatiekans</a:t>
+            </a:r>
+            <a:r>
+              <a:rPr lang="en-US" dirty="0"/>
+              <a:t> </a:t>
+            </a:r>
+            <a:r>
+              <a:rPr lang="en-US" dirty="0" err="1"/>
+              <a:t>aanpassen</a:t>
+            </a:r>
             <a:endParaRPr lang="en-US" dirty="0"/>
           </a:p>
           <a:p>
             <a:pPr lvl="1"/>
             <a:r>
               <a:rPr lang="en-US" dirty="0" err="1"/>
-              <a:t>Daarna</a:t>
-            </a:r>
-            <a:r>
-              <a:rPr lang="en-US" dirty="0"/>
-              <a:t> genetic, </a:t>
-            </a:r>
-            <a:r>
-              <a:rPr lang="en-US" dirty="0" err="1"/>
-              <a:t>hillclimber</a:t>
-            </a:r>
-            <a:r>
-              <a:rPr lang="en-US" dirty="0"/>
-              <a:t>, </a:t>
-            </a:r>
+              <a:t>Populatiegrootte</a:t>
+            </a:r>
+            <a:r>
+              <a:rPr lang="en-US" dirty="0"/>
+              <a:t> en </a:t>
+            </a:r>
+            <a:r>
+              <a:rPr lang="en-US" dirty="0" err="1"/>
+              <a:t>aantal</a:t>
+            </a:r>
+            <a:r>
+              <a:rPr lang="en-US" dirty="0"/>
+              <a:t> </a:t>
+            </a:r>
+            <a:r>
+              <a:rPr lang="en-US" dirty="0" err="1"/>
+              <a:t>generaties</a:t>
+            </a:r>
+            <a:endParaRPr lang="en-US" dirty="0"/>
+          </a:p>
+          <a:p>
+            <a:pPr lvl="1"/>
+            <a:endParaRPr lang="en-US" dirty="0"/>
+          </a:p>
+          <a:p>
+            <a:pPr lvl="1"/>
+            <a:endParaRPr lang="en-US" dirty="0"/>
+          </a:p>
+          <a:p>
+            <a:pPr lvl="1"/>
+            <a:endParaRPr lang="en-US" dirty="0"/>
           </a:p>
         </p:txBody>
       </p:sp>
     </p:spTree>
     <p:extLst>
       <p:ext uri="{BB962C8B-B14F-4D97-AF65-F5344CB8AC3E}">
-        <p14:creationId xmlns:p14="http://schemas.microsoft.com/office/powerpoint/2010/main" val="2033092415"/>
+        <p14:creationId xmlns:p14="http://schemas.microsoft.com/office/powerpoint/2010/main" val="161738935"/>
       </p:ext>
     </p:extLst>
   </p:cSld>
   <p:clrMapOvr>
     <a:masterClrMapping/>
   </p:clrMapOvr>
+  <p:timing>
+    <p:tnLst>
+      <p:par>
+        <p:cTn id="1" dur="indefinite" restart="never" nodeType="tmRoot"/>
+      </p:par>
+    </p:tnLst>
+  </p:timing>
 </p:sld>
 </file>
 
@@ -5085,17 +5791,14 @@
         <p:spPr/>
         <p:txBody>
           <a:bodyPr>
-            <a:normAutofit fontScale="90000"/>
+            <a:normAutofit/>
           </a:bodyPr>
           <a:lstStyle/>
           <a:p>
             <a:r>
               <a:rPr lang="en-US" dirty="0" err="1"/>
-              <a:t>Resultaten</a:t>
-            </a:r>
-            <a:br>
-              <a:rPr lang="en-US" dirty="0"/>
-            </a:br>
+              <a:t>Eperimenteren</a:t>
+            </a:r>
             <a:endParaRPr lang="en-US" dirty="0"/>
           </a:p>
         </p:txBody>
@@ -5112,169 +5815,69 @@
         </p:nvSpPr>
         <p:spPr/>
         <p:txBody>
-          <a:bodyPr>
-            <a:normAutofit fontScale="92500" lnSpcReduction="10000"/>
-          </a:bodyPr>
+          <a:bodyPr/>
           <a:lstStyle/>
           <a:p>
             <a:r>
               <a:rPr lang="en-US" dirty="0" err="1"/>
-              <a:t>Hillclimber</a:t>
-            </a:r>
-            <a:r>
-              <a:rPr lang="en-US" dirty="0"/>
-              <a:t>/simulated annealing</a:t>
-            </a:r>
+              <a:t>Hybride</a:t>
+            </a:r>
+            <a:endParaRPr lang="en-US" dirty="0"/>
           </a:p>
           <a:p>
             <a:pPr lvl="1"/>
             <a:r>
-              <a:rPr lang="en-US" dirty="0"/>
-              <a:t>Random sampling</a:t>
-            </a:r>
+              <a:rPr lang="en-US" dirty="0" err="1"/>
+              <a:t>Eerst</a:t>
+            </a:r>
+            <a:r>
+              <a:rPr lang="en-US" dirty="0"/>
+              <a:t> sequential op </a:t>
+            </a:r>
+            <a:r>
+              <a:rPr lang="en-US" dirty="0" err="1"/>
+              <a:t>zaalgrootte</a:t>
+            </a:r>
+            <a:endParaRPr lang="en-US" dirty="0"/>
           </a:p>
           <a:p>
             <a:pPr lvl="1"/>
             <a:r>
-              <a:rPr lang="en-US" dirty="0"/>
-              <a:t>Score </a:t>
-            </a:r>
-            <a:r>
-              <a:rPr lang="en-US" dirty="0" err="1"/>
-              <a:t>vs</a:t>
-            </a:r>
-            <a:r>
-              <a:rPr lang="en-US" dirty="0"/>
-              <a:t> </a:t>
-            </a:r>
-            <a:r>
-              <a:rPr lang="en-US" dirty="0" err="1"/>
-              <a:t>iteraties</a:t>
-            </a:r>
-            <a:endParaRPr lang="en-US" dirty="0"/>
-          </a:p>
-          <a:p>
-            <a:r>
-              <a:rPr lang="en-US" dirty="0"/>
-              <a:t>Genetic</a:t>
-            </a:r>
-          </a:p>
-          <a:p>
-            <a:pPr lvl="1"/>
-            <a:r>
-              <a:rPr lang="en-US" dirty="0"/>
-              <a:t>Random sampling</a:t>
-            </a:r>
-          </a:p>
-          <a:p>
-            <a:pPr lvl="1"/>
-            <a:r>
-              <a:rPr lang="en-US" dirty="0"/>
-              <a:t>Score </a:t>
-            </a:r>
-            <a:r>
-              <a:rPr lang="en-US" dirty="0" err="1"/>
-              <a:t>vs</a:t>
-            </a:r>
-            <a:r>
-              <a:rPr lang="en-US" dirty="0"/>
-              <a:t> </a:t>
-            </a:r>
-            <a:r>
-              <a:rPr lang="en-US" dirty="0" err="1"/>
-              <a:t>generatie</a:t>
-            </a:r>
-            <a:endParaRPr lang="en-US" dirty="0"/>
-          </a:p>
-          <a:p>
-            <a:r>
-              <a:rPr lang="en-US" dirty="0" err="1"/>
-              <a:t>Hybride</a:t>
-            </a:r>
-            <a:endParaRPr lang="en-US" dirty="0"/>
-          </a:p>
-          <a:p>
-            <a:pPr lvl="1"/>
-            <a:r>
-              <a:rPr lang="en-US" dirty="0" err="1"/>
-              <a:t>Tussen</a:t>
-            </a:r>
-            <a:r>
-              <a:rPr lang="en-US" dirty="0"/>
-              <a:t> score </a:t>
-            </a:r>
-            <a:r>
-              <a:rPr lang="en-US" dirty="0" err="1"/>
-              <a:t>na</a:t>
-            </a:r>
-            <a:r>
-              <a:rPr lang="en-US" dirty="0"/>
-              <a:t> </a:t>
-            </a:r>
-            <a:r>
-              <a:rPr lang="en-US" dirty="0" err="1"/>
-              <a:t>elke</a:t>
-            </a:r>
-            <a:r>
-              <a:rPr lang="en-US" dirty="0"/>
-              <a:t> </a:t>
-            </a:r>
-            <a:r>
-              <a:rPr lang="en-US" dirty="0" err="1"/>
-              <a:t>algortime</a:t>
-            </a:r>
-            <a:endParaRPr lang="en-US" dirty="0"/>
-          </a:p>
-          <a:p>
-            <a:pPr lvl="1"/>
-            <a:r>
-              <a:rPr lang="en-US" dirty="0"/>
-              <a:t>Random sampling</a:t>
-            </a:r>
-          </a:p>
-          <a:p>
-            <a:pPr lvl="1"/>
-            <a:r>
-              <a:rPr lang="en-US" dirty="0"/>
-              <a:t>Score </a:t>
-            </a:r>
-            <a:r>
-              <a:rPr lang="en-US" dirty="0" err="1"/>
-              <a:t>vs</a:t>
-            </a:r>
-            <a:r>
-              <a:rPr lang="en-US" dirty="0"/>
-              <a:t> </a:t>
-            </a:r>
-            <a:r>
-              <a:rPr lang="en-US" dirty="0" err="1"/>
-              <a:t>iteraties</a:t>
-            </a:r>
-            <a:r>
-              <a:rPr lang="en-US" dirty="0"/>
-              <a:t> </a:t>
-            </a:r>
-          </a:p>
-          <a:p>
-            <a:pPr lvl="1"/>
-            <a:endParaRPr lang="en-US" dirty="0"/>
-          </a:p>
-          <a:p>
-            <a:pPr lvl="1"/>
-            <a:endParaRPr lang="en-US" dirty="0"/>
+              <a:rPr lang="en-US" dirty="0" err="1"/>
+              <a:t>Daarna</a:t>
+            </a:r>
+            <a:r>
+              <a:rPr lang="en-US" dirty="0"/>
+              <a:t> genetic, </a:t>
+            </a:r>
+            <a:r>
+              <a:rPr lang="en-US" dirty="0" err="1"/>
+              <a:t>hillclimber</a:t>
+            </a:r>
+            <a:r>
+              <a:rPr lang="en-US" dirty="0"/>
+              <a:t>, </a:t>
+            </a:r>
           </a:p>
         </p:txBody>
       </p:sp>
     </p:spTree>
     <p:extLst>
       <p:ext uri="{BB962C8B-B14F-4D97-AF65-F5344CB8AC3E}">
-        <p14:creationId xmlns:p14="http://schemas.microsoft.com/office/powerpoint/2010/main" val="4264903066"/>
+        <p14:creationId xmlns:p14="http://schemas.microsoft.com/office/powerpoint/2010/main" val="2033092415"/>
       </p:ext>
     </p:extLst>
   </p:cSld>
   <p:clrMapOvr>
     <a:masterClrMapping/>
   </p:clrMapOvr>
+  <p:timing>
+    <p:tnLst>
+      <p:par>
+        <p:cTn id="1" dur="indefinite" restart="never" nodeType="tmRoot"/>
+      </p:par>
+    </p:tnLst>
+  </p:timing>
 </p:sld>
 </file>
 

</xml_diff>